<commit_message>
Readied Lab 2 content
</commit_message>
<xml_diff>
--- a/website/labs/get_started/pictures/flow-charts.pptx
+++ b/website/labs/get_started/pictures/flow-charts.pptx
@@ -7,6 +7,7 @@
   <p:sldIdLst>
     <p:sldId id="256" r:id="rId2"/>
     <p:sldId id="257" r:id="rId3"/>
+    <p:sldId id="258" r:id="rId4"/>
   </p:sldIdLst>
   <p:sldSz cx="12801600" cy="9601200" type="A3"/>
   <p:notesSz cx="6858000" cy="9144000"/>
@@ -105,6 +106,11 @@
       </a:defRPr>
     </a:lvl9pPr>
   </p:defaultTextStyle>
+  <p:extLst>
+    <p:ext uri="{EFAFB233-063F-42B5-8137-9DF3F51BA10A}">
+      <p15:sldGuideLst xmlns:p15="http://schemas.microsoft.com/office/powerpoint/2012/main"/>
+    </p:ext>
+  </p:extLst>
 </p:presentation>
 </file>
 
@@ -239,7 +245,7 @@
           <a:p>
             <a:fld id="{B85DF64A-A64B-9B40-9390-C6B9C8EAFEF9}" type="datetimeFigureOut">
               <a:rPr lang="en-US" smtClean="0"/>
-              <a:t>10/21/24</a:t>
+              <a:t>10/23/24</a:t>
             </a:fld>
             <a:endParaRPr lang="en-US"/>
           </a:p>
@@ -409,7 +415,7 @@
           <a:p>
             <a:fld id="{B85DF64A-A64B-9B40-9390-C6B9C8EAFEF9}" type="datetimeFigureOut">
               <a:rPr lang="en-US" smtClean="0"/>
-              <a:t>10/21/24</a:t>
+              <a:t>10/23/24</a:t>
             </a:fld>
             <a:endParaRPr lang="en-US"/>
           </a:p>
@@ -589,7 +595,7 @@
           <a:p>
             <a:fld id="{B85DF64A-A64B-9B40-9390-C6B9C8EAFEF9}" type="datetimeFigureOut">
               <a:rPr lang="en-US" smtClean="0"/>
-              <a:t>10/21/24</a:t>
+              <a:t>10/23/24</a:t>
             </a:fld>
             <a:endParaRPr lang="en-US"/>
           </a:p>
@@ -759,7 +765,7 @@
           <a:p>
             <a:fld id="{B85DF64A-A64B-9B40-9390-C6B9C8EAFEF9}" type="datetimeFigureOut">
               <a:rPr lang="en-US" smtClean="0"/>
-              <a:t>10/21/24</a:t>
+              <a:t>10/23/24</a:t>
             </a:fld>
             <a:endParaRPr lang="en-US"/>
           </a:p>
@@ -1005,7 +1011,7 @@
           <a:p>
             <a:fld id="{B85DF64A-A64B-9B40-9390-C6B9C8EAFEF9}" type="datetimeFigureOut">
               <a:rPr lang="en-US" smtClean="0"/>
-              <a:t>10/21/24</a:t>
+              <a:t>10/23/24</a:t>
             </a:fld>
             <a:endParaRPr lang="en-US"/>
           </a:p>
@@ -1237,7 +1243,7 @@
           <a:p>
             <a:fld id="{B85DF64A-A64B-9B40-9390-C6B9C8EAFEF9}" type="datetimeFigureOut">
               <a:rPr lang="en-US" smtClean="0"/>
-              <a:t>10/21/24</a:t>
+              <a:t>10/23/24</a:t>
             </a:fld>
             <a:endParaRPr lang="en-US"/>
           </a:p>
@@ -1604,7 +1610,7 @@
           <a:p>
             <a:fld id="{B85DF64A-A64B-9B40-9390-C6B9C8EAFEF9}" type="datetimeFigureOut">
               <a:rPr lang="en-US" smtClean="0"/>
-              <a:t>10/21/24</a:t>
+              <a:t>10/23/24</a:t>
             </a:fld>
             <a:endParaRPr lang="en-US"/>
           </a:p>
@@ -1722,7 +1728,7 @@
           <a:p>
             <a:fld id="{B85DF64A-A64B-9B40-9390-C6B9C8EAFEF9}" type="datetimeFigureOut">
               <a:rPr lang="en-US" smtClean="0"/>
-              <a:t>10/21/24</a:t>
+              <a:t>10/23/24</a:t>
             </a:fld>
             <a:endParaRPr lang="en-US"/>
           </a:p>
@@ -1817,7 +1823,7 @@
           <a:p>
             <a:fld id="{B85DF64A-A64B-9B40-9390-C6B9C8EAFEF9}" type="datetimeFigureOut">
               <a:rPr lang="en-US" smtClean="0"/>
-              <a:t>10/21/24</a:t>
+              <a:t>10/23/24</a:t>
             </a:fld>
             <a:endParaRPr lang="en-US"/>
           </a:p>
@@ -2094,7 +2100,7 @@
           <a:p>
             <a:fld id="{B85DF64A-A64B-9B40-9390-C6B9C8EAFEF9}" type="datetimeFigureOut">
               <a:rPr lang="en-US" smtClean="0"/>
-              <a:t>10/21/24</a:t>
+              <a:t>10/23/24</a:t>
             </a:fld>
             <a:endParaRPr lang="en-US"/>
           </a:p>
@@ -2351,7 +2357,7 @@
           <a:p>
             <a:fld id="{B85DF64A-A64B-9B40-9390-C6B9C8EAFEF9}" type="datetimeFigureOut">
               <a:rPr lang="en-US" smtClean="0"/>
-              <a:t>10/21/24</a:t>
+              <a:t>10/23/24</a:t>
             </a:fld>
             <a:endParaRPr lang="en-US"/>
           </a:p>
@@ -2564,7 +2570,7 @@
           <a:p>
             <a:fld id="{B85DF64A-A64B-9B40-9390-C6B9C8EAFEF9}" type="datetimeFigureOut">
               <a:rPr lang="en-US" smtClean="0"/>
-              <a:t>10/21/24</a:t>
+              <a:t>10/23/24</a:t>
             </a:fld>
             <a:endParaRPr lang="en-US"/>
           </a:p>
@@ -6257,6 +6263,1353 @@
     <p:extLst>
       <p:ext uri="{BB962C8B-B14F-4D97-AF65-F5344CB8AC3E}">
         <p14:creationId xmlns:p14="http://schemas.microsoft.com/office/powerpoint/2010/main" val="2594775046"/>
+      </p:ext>
+    </p:extLst>
+  </p:cSld>
+  <p:clrMapOvr>
+    <a:masterClrMapping/>
+  </p:clrMapOvr>
+</p:sld>
+</file>
+
+<file path=ppt/slides/slide3.xml><?xml version="1.0" encoding="utf-8"?>
+<p:sld xmlns:a="http://schemas.openxmlformats.org/drawingml/2006/main" xmlns:r="http://schemas.openxmlformats.org/officeDocument/2006/relationships" xmlns:p="http://schemas.openxmlformats.org/presentationml/2006/main">
+  <p:cSld>
+    <p:spTree>
+      <p:nvGrpSpPr>
+        <p:cNvPr id="1" name="">
+          <a:extLst>
+            <a:ext uri="{FF2B5EF4-FFF2-40B4-BE49-F238E27FC236}">
+              <a16:creationId xmlns:a16="http://schemas.microsoft.com/office/drawing/2014/main" id="{F4AC9F34-24BA-453D-AEFD-928F217600CE}"/>
+            </a:ext>
+          </a:extLst>
+        </p:cNvPr>
+        <p:cNvGrpSpPr/>
+        <p:nvPr/>
+      </p:nvGrpSpPr>
+      <p:grpSpPr>
+        <a:xfrm>
+          <a:off x="0" y="0"/>
+          <a:ext cx="0" cy="0"/>
+          <a:chOff x="0" y="0"/>
+          <a:chExt cx="0" cy="0"/>
+        </a:xfrm>
+      </p:grpSpPr>
+      <p:sp>
+        <p:nvSpPr>
+          <p:cNvPr id="14" name="TextBox 13">
+            <a:extLst>
+              <a:ext uri="{FF2B5EF4-FFF2-40B4-BE49-F238E27FC236}">
+                <a16:creationId xmlns:a16="http://schemas.microsoft.com/office/drawing/2014/main" id="{B1AB4BC4-3361-44EC-B704-4FE38B4FCDB9}"/>
+              </a:ext>
+            </a:extLst>
+          </p:cNvPr>
+          <p:cNvSpPr txBox="1"/>
+          <p:nvPr/>
+        </p:nvSpPr>
+        <p:spPr>
+          <a:xfrm>
+            <a:off x="880865" y="8312419"/>
+            <a:ext cx="2239780" cy="369332"/>
+          </a:xfrm>
+          <a:prstGeom prst="rect">
+            <a:avLst/>
+          </a:prstGeom>
+          <a:noFill/>
+        </p:spPr>
+        <p:txBody>
+          <a:bodyPr wrap="none" rtlCol="0">
+            <a:spAutoFit/>
+          </a:bodyPr>
+          <a:lstStyle/>
+          <a:p>
+            <a:r>
+              <a:rPr lang="en-US" dirty="0"/>
+              <a:t>a) Setup Subprocess</a:t>
+            </a:r>
+          </a:p>
+        </p:txBody>
+      </p:sp>
+      <p:grpSp>
+        <p:nvGrpSpPr>
+          <p:cNvPr id="38" name="Group 37">
+            <a:extLst>
+              <a:ext uri="{FF2B5EF4-FFF2-40B4-BE49-F238E27FC236}">
+                <a16:creationId xmlns:a16="http://schemas.microsoft.com/office/drawing/2014/main" id="{60C90194-65E9-21F7-16B5-6D8A7AE3778A}"/>
+              </a:ext>
+            </a:extLst>
+          </p:cNvPr>
+          <p:cNvGrpSpPr/>
+          <p:nvPr/>
+        </p:nvGrpSpPr>
+        <p:grpSpPr>
+          <a:xfrm>
+            <a:off x="983515" y="2968783"/>
+            <a:ext cx="2122671" cy="4308607"/>
+            <a:chOff x="568289" y="728151"/>
+            <a:chExt cx="2122671" cy="4308607"/>
+          </a:xfrm>
+        </p:grpSpPr>
+        <p:sp>
+          <p:nvSpPr>
+            <p:cNvPr id="5" name="Process 4">
+              <a:extLst>
+                <a:ext uri="{FF2B5EF4-FFF2-40B4-BE49-F238E27FC236}">
+                  <a16:creationId xmlns:a16="http://schemas.microsoft.com/office/drawing/2014/main" id="{50ECBF42-E8D7-9514-75CC-44007F66B760}"/>
+                </a:ext>
+              </a:extLst>
+            </p:cNvPr>
+            <p:cNvSpPr/>
+            <p:nvPr/>
+          </p:nvSpPr>
+          <p:spPr>
+            <a:xfrm>
+              <a:off x="568289" y="1434232"/>
+              <a:ext cx="2122671" cy="753798"/>
+            </a:xfrm>
+            <a:prstGeom prst="flowChartProcess">
+              <a:avLst/>
+            </a:prstGeom>
+            <a:solidFill>
+              <a:schemeClr val="accent4"/>
+            </a:solidFill>
+            <a:ln>
+              <a:solidFill>
+                <a:schemeClr val="accent4"/>
+              </a:solidFill>
+            </a:ln>
+          </p:spPr>
+          <p:style>
+            <a:lnRef idx="2">
+              <a:schemeClr val="accent1">
+                <a:shade val="15000"/>
+              </a:schemeClr>
+            </a:lnRef>
+            <a:fillRef idx="1">
+              <a:schemeClr val="accent1"/>
+            </a:fillRef>
+            <a:effectRef idx="0">
+              <a:schemeClr val="accent1"/>
+            </a:effectRef>
+            <a:fontRef idx="minor">
+              <a:schemeClr val="lt1"/>
+            </a:fontRef>
+          </p:style>
+          <p:txBody>
+            <a:bodyPr rtlCol="0" anchor="ctr"/>
+            <a:lstStyle/>
+            <a:p>
+              <a:pPr algn="ctr"/>
+              <a:r>
+                <a:rPr lang="en-US" dirty="0"/>
+                <a:t>initialize counters</a:t>
+              </a:r>
+            </a:p>
+          </p:txBody>
+        </p:sp>
+        <p:sp>
+          <p:nvSpPr>
+            <p:cNvPr id="6" name="Connector 5">
+              <a:extLst>
+                <a:ext uri="{FF2B5EF4-FFF2-40B4-BE49-F238E27FC236}">
+                  <a16:creationId xmlns:a16="http://schemas.microsoft.com/office/drawing/2014/main" id="{F0D19933-F9B1-03B7-C811-E58AF86FA2CC}"/>
+                </a:ext>
+              </a:extLst>
+            </p:cNvPr>
+            <p:cNvSpPr/>
+            <p:nvPr/>
+          </p:nvSpPr>
+          <p:spPr>
+            <a:xfrm>
+              <a:off x="1464127" y="728151"/>
+              <a:ext cx="370115" cy="370115"/>
+            </a:xfrm>
+            <a:prstGeom prst="flowChartConnector">
+              <a:avLst/>
+            </a:prstGeom>
+            <a:solidFill>
+              <a:schemeClr val="bg1"/>
+            </a:solidFill>
+          </p:spPr>
+          <p:style>
+            <a:lnRef idx="2">
+              <a:schemeClr val="accent1">
+                <a:shade val="15000"/>
+              </a:schemeClr>
+            </a:lnRef>
+            <a:fillRef idx="1">
+              <a:schemeClr val="accent1"/>
+            </a:fillRef>
+            <a:effectRef idx="0">
+              <a:schemeClr val="accent1"/>
+            </a:effectRef>
+            <a:fontRef idx="minor">
+              <a:schemeClr val="lt1"/>
+            </a:fontRef>
+          </p:style>
+          <p:txBody>
+            <a:bodyPr rtlCol="0" anchor="ctr"/>
+            <a:lstStyle/>
+            <a:p>
+              <a:pPr algn="ctr"/>
+              <a:endParaRPr lang="en-US"/>
+            </a:p>
+          </p:txBody>
+        </p:sp>
+        <p:cxnSp>
+          <p:nvCxnSpPr>
+            <p:cNvPr id="7" name="Straight Arrow Connector 6">
+              <a:extLst>
+                <a:ext uri="{FF2B5EF4-FFF2-40B4-BE49-F238E27FC236}">
+                  <a16:creationId xmlns:a16="http://schemas.microsoft.com/office/drawing/2014/main" id="{FF0FEC0A-1A6F-7F3C-8110-12BED2AAC0CA}"/>
+                </a:ext>
+              </a:extLst>
+            </p:cNvPr>
+            <p:cNvCxnSpPr>
+              <a:cxnSpLocks/>
+            </p:cNvCxnSpPr>
+            <p:nvPr/>
+          </p:nvCxnSpPr>
+          <p:spPr>
+            <a:xfrm>
+              <a:off x="1649184" y="1115405"/>
+              <a:ext cx="0" cy="316467"/>
+            </a:xfrm>
+            <a:prstGeom prst="straightConnector1">
+              <a:avLst/>
+            </a:prstGeom>
+            <a:ln w="28575">
+              <a:solidFill>
+                <a:schemeClr val="accent1"/>
+              </a:solidFill>
+              <a:tailEnd type="triangle"/>
+            </a:ln>
+          </p:spPr>
+          <p:style>
+            <a:lnRef idx="2">
+              <a:schemeClr val="accent1"/>
+            </a:lnRef>
+            <a:fillRef idx="0">
+              <a:schemeClr val="accent1"/>
+            </a:fillRef>
+            <a:effectRef idx="1">
+              <a:schemeClr val="accent1"/>
+            </a:effectRef>
+            <a:fontRef idx="minor">
+              <a:schemeClr val="tx1"/>
+            </a:fontRef>
+          </p:style>
+        </p:cxnSp>
+        <p:cxnSp>
+          <p:nvCxnSpPr>
+            <p:cNvPr id="8" name="Straight Arrow Connector 7">
+              <a:extLst>
+                <a:ext uri="{FF2B5EF4-FFF2-40B4-BE49-F238E27FC236}">
+                  <a16:creationId xmlns:a16="http://schemas.microsoft.com/office/drawing/2014/main" id="{57059BBE-81F4-2A55-F334-A9D2C919C06F}"/>
+                </a:ext>
+              </a:extLst>
+            </p:cNvPr>
+            <p:cNvCxnSpPr>
+              <a:cxnSpLocks/>
+            </p:cNvCxnSpPr>
+            <p:nvPr/>
+          </p:nvCxnSpPr>
+          <p:spPr>
+            <a:xfrm>
+              <a:off x="1649184" y="2188030"/>
+              <a:ext cx="0" cy="316467"/>
+            </a:xfrm>
+            <a:prstGeom prst="straightConnector1">
+              <a:avLst/>
+            </a:prstGeom>
+            <a:ln w="28575">
+              <a:solidFill>
+                <a:schemeClr val="accent1"/>
+              </a:solidFill>
+              <a:tailEnd type="triangle"/>
+            </a:ln>
+          </p:spPr>
+          <p:style>
+            <a:lnRef idx="2">
+              <a:schemeClr val="accent1"/>
+            </a:lnRef>
+            <a:fillRef idx="0">
+              <a:schemeClr val="accent1"/>
+            </a:fillRef>
+            <a:effectRef idx="1">
+              <a:schemeClr val="accent1"/>
+            </a:effectRef>
+            <a:fontRef idx="minor">
+              <a:schemeClr val="tx1"/>
+            </a:fontRef>
+          </p:style>
+        </p:cxnSp>
+        <p:sp>
+          <p:nvSpPr>
+            <p:cNvPr id="9" name="Connector 8">
+              <a:extLst>
+                <a:ext uri="{FF2B5EF4-FFF2-40B4-BE49-F238E27FC236}">
+                  <a16:creationId xmlns:a16="http://schemas.microsoft.com/office/drawing/2014/main" id="{B17D9EF5-7665-6BF5-F7C5-18B64C34C188}"/>
+                </a:ext>
+              </a:extLst>
+            </p:cNvPr>
+            <p:cNvSpPr/>
+            <p:nvPr/>
+          </p:nvSpPr>
+          <p:spPr>
+            <a:xfrm>
+              <a:off x="1464127" y="4666643"/>
+              <a:ext cx="370115" cy="370115"/>
+            </a:xfrm>
+            <a:prstGeom prst="flowChartConnector">
+              <a:avLst/>
+            </a:prstGeom>
+            <a:solidFill>
+              <a:schemeClr val="bg1"/>
+            </a:solidFill>
+          </p:spPr>
+          <p:style>
+            <a:lnRef idx="2">
+              <a:schemeClr val="accent1">
+                <a:shade val="15000"/>
+              </a:schemeClr>
+            </a:lnRef>
+            <a:fillRef idx="1">
+              <a:schemeClr val="accent1"/>
+            </a:fillRef>
+            <a:effectRef idx="0">
+              <a:schemeClr val="accent1"/>
+            </a:effectRef>
+            <a:fontRef idx="minor">
+              <a:schemeClr val="lt1"/>
+            </a:fontRef>
+          </p:style>
+          <p:txBody>
+            <a:bodyPr rtlCol="0" anchor="ctr"/>
+            <a:lstStyle/>
+            <a:p>
+              <a:pPr algn="ctr"/>
+              <a:endParaRPr lang="en-US"/>
+            </a:p>
+          </p:txBody>
+        </p:sp>
+        <p:sp>
+          <p:nvSpPr>
+            <p:cNvPr id="10" name="Process 9">
+              <a:extLst>
+                <a:ext uri="{FF2B5EF4-FFF2-40B4-BE49-F238E27FC236}">
+                  <a16:creationId xmlns:a16="http://schemas.microsoft.com/office/drawing/2014/main" id="{99C33921-7419-218B-959D-6B709BB6D6C5}"/>
+                </a:ext>
+              </a:extLst>
+            </p:cNvPr>
+            <p:cNvSpPr/>
+            <p:nvPr/>
+          </p:nvSpPr>
+          <p:spPr>
+            <a:xfrm>
+              <a:off x="568289" y="2516566"/>
+              <a:ext cx="2122671" cy="753798"/>
+            </a:xfrm>
+            <a:prstGeom prst="flowChartProcess">
+              <a:avLst/>
+            </a:prstGeom>
+            <a:solidFill>
+              <a:schemeClr val="accent4"/>
+            </a:solidFill>
+            <a:ln>
+              <a:solidFill>
+                <a:schemeClr val="accent4"/>
+              </a:solidFill>
+            </a:ln>
+          </p:spPr>
+          <p:style>
+            <a:lnRef idx="2">
+              <a:schemeClr val="accent1">
+                <a:shade val="15000"/>
+              </a:schemeClr>
+            </a:lnRef>
+            <a:fillRef idx="1">
+              <a:schemeClr val="accent1"/>
+            </a:fillRef>
+            <a:effectRef idx="0">
+              <a:schemeClr val="accent1"/>
+            </a:effectRef>
+            <a:fontRef idx="minor">
+              <a:schemeClr val="lt1"/>
+            </a:fontRef>
+          </p:style>
+          <p:txBody>
+            <a:bodyPr rtlCol="0" anchor="ctr"/>
+            <a:lstStyle/>
+            <a:p>
+              <a:pPr algn="ctr"/>
+              <a:r>
+                <a:rPr lang="en-US" sz="1600" dirty="0"/>
+                <a:t>Set bits 0-5 of PORTB and PORTC to outputs</a:t>
+              </a:r>
+            </a:p>
+          </p:txBody>
+        </p:sp>
+        <p:cxnSp>
+          <p:nvCxnSpPr>
+            <p:cNvPr id="12" name="Straight Arrow Connector 11">
+              <a:extLst>
+                <a:ext uri="{FF2B5EF4-FFF2-40B4-BE49-F238E27FC236}">
+                  <a16:creationId xmlns:a16="http://schemas.microsoft.com/office/drawing/2014/main" id="{FE9FB6DD-B8D3-5C9D-6091-7544899E1CCE}"/>
+                </a:ext>
+              </a:extLst>
+            </p:cNvPr>
+            <p:cNvCxnSpPr>
+              <a:cxnSpLocks/>
+            </p:cNvCxnSpPr>
+            <p:nvPr/>
+          </p:nvCxnSpPr>
+          <p:spPr>
+            <a:xfrm>
+              <a:off x="1649184" y="3270766"/>
+              <a:ext cx="0" cy="316467"/>
+            </a:xfrm>
+            <a:prstGeom prst="straightConnector1">
+              <a:avLst/>
+            </a:prstGeom>
+            <a:ln w="28575">
+              <a:solidFill>
+                <a:schemeClr val="accent1"/>
+              </a:solidFill>
+              <a:tailEnd type="triangle"/>
+            </a:ln>
+          </p:spPr>
+          <p:style>
+            <a:lnRef idx="2">
+              <a:schemeClr val="accent1"/>
+            </a:lnRef>
+            <a:fillRef idx="0">
+              <a:schemeClr val="accent1"/>
+            </a:fillRef>
+            <a:effectRef idx="1">
+              <a:schemeClr val="accent1"/>
+            </a:effectRef>
+            <a:fontRef idx="minor">
+              <a:schemeClr val="tx1"/>
+            </a:fontRef>
+          </p:style>
+        </p:cxnSp>
+        <p:cxnSp>
+          <p:nvCxnSpPr>
+            <p:cNvPr id="13" name="Straight Arrow Connector 12">
+              <a:extLst>
+                <a:ext uri="{FF2B5EF4-FFF2-40B4-BE49-F238E27FC236}">
+                  <a16:creationId xmlns:a16="http://schemas.microsoft.com/office/drawing/2014/main" id="{3D76F6CB-F5E6-A6A5-2B78-9ECE8C81FA7C}"/>
+                </a:ext>
+              </a:extLst>
+            </p:cNvPr>
+            <p:cNvCxnSpPr>
+              <a:cxnSpLocks/>
+            </p:cNvCxnSpPr>
+            <p:nvPr/>
+          </p:nvCxnSpPr>
+          <p:spPr>
+            <a:xfrm>
+              <a:off x="1649184" y="4350176"/>
+              <a:ext cx="0" cy="316467"/>
+            </a:xfrm>
+            <a:prstGeom prst="straightConnector1">
+              <a:avLst/>
+            </a:prstGeom>
+            <a:ln w="28575">
+              <a:solidFill>
+                <a:schemeClr val="accent1"/>
+              </a:solidFill>
+              <a:tailEnd type="triangle"/>
+            </a:ln>
+          </p:spPr>
+          <p:style>
+            <a:lnRef idx="2">
+              <a:schemeClr val="accent1"/>
+            </a:lnRef>
+            <a:fillRef idx="0">
+              <a:schemeClr val="accent1"/>
+            </a:fillRef>
+            <a:effectRef idx="1">
+              <a:schemeClr val="accent1"/>
+            </a:effectRef>
+            <a:fontRef idx="minor">
+              <a:schemeClr val="tx1"/>
+            </a:fontRef>
+          </p:style>
+        </p:cxnSp>
+        <p:sp>
+          <p:nvSpPr>
+            <p:cNvPr id="3" name="Process 2">
+              <a:extLst>
+                <a:ext uri="{FF2B5EF4-FFF2-40B4-BE49-F238E27FC236}">
+                  <a16:creationId xmlns:a16="http://schemas.microsoft.com/office/drawing/2014/main" id="{900EE3BF-BE0C-9252-15D8-BE5C6B1578E4}"/>
+                </a:ext>
+              </a:extLst>
+            </p:cNvPr>
+            <p:cNvSpPr/>
+            <p:nvPr/>
+          </p:nvSpPr>
+          <p:spPr>
+            <a:xfrm>
+              <a:off x="568289" y="3583207"/>
+              <a:ext cx="2122671" cy="753798"/>
+            </a:xfrm>
+            <a:prstGeom prst="flowChartProcess">
+              <a:avLst/>
+            </a:prstGeom>
+            <a:solidFill>
+              <a:schemeClr val="accent4"/>
+            </a:solidFill>
+            <a:ln>
+              <a:solidFill>
+                <a:schemeClr val="accent4"/>
+              </a:solidFill>
+            </a:ln>
+          </p:spPr>
+          <p:style>
+            <a:lnRef idx="2">
+              <a:schemeClr val="accent1">
+                <a:shade val="15000"/>
+              </a:schemeClr>
+            </a:lnRef>
+            <a:fillRef idx="1">
+              <a:schemeClr val="accent1"/>
+            </a:fillRef>
+            <a:effectRef idx="0">
+              <a:schemeClr val="accent1"/>
+            </a:effectRef>
+            <a:fontRef idx="minor">
+              <a:schemeClr val="lt1"/>
+            </a:fontRef>
+          </p:style>
+          <p:txBody>
+            <a:bodyPr rtlCol="0" anchor="ctr"/>
+            <a:lstStyle/>
+            <a:p>
+              <a:pPr algn="ctr"/>
+              <a:r>
+                <a:rPr lang="en-GB" sz="1600" dirty="0"/>
+                <a:t>Make bit 2 of Port D an input</a:t>
+              </a:r>
+            </a:p>
+          </p:txBody>
+        </p:sp>
+      </p:grpSp>
+      <p:sp>
+        <p:nvSpPr>
+          <p:cNvPr id="24" name="Connector 23">
+            <a:extLst>
+              <a:ext uri="{FF2B5EF4-FFF2-40B4-BE49-F238E27FC236}">
+                <a16:creationId xmlns:a16="http://schemas.microsoft.com/office/drawing/2014/main" id="{B8C95C21-79E8-870E-80F7-FA776D7F9FE9}"/>
+              </a:ext>
+            </a:extLst>
+          </p:cNvPr>
+          <p:cNvSpPr/>
+          <p:nvPr/>
+        </p:nvSpPr>
+        <p:spPr>
+          <a:xfrm>
+            <a:off x="5527018" y="2305389"/>
+            <a:ext cx="370115" cy="370115"/>
+          </a:xfrm>
+          <a:prstGeom prst="flowChartConnector">
+            <a:avLst/>
+          </a:prstGeom>
+          <a:solidFill>
+            <a:schemeClr val="bg1"/>
+          </a:solidFill>
+        </p:spPr>
+        <p:style>
+          <a:lnRef idx="2">
+            <a:schemeClr val="accent1">
+              <a:shade val="15000"/>
+            </a:schemeClr>
+          </a:lnRef>
+          <a:fillRef idx="1">
+            <a:schemeClr val="accent1"/>
+          </a:fillRef>
+          <a:effectRef idx="0">
+            <a:schemeClr val="accent1"/>
+          </a:effectRef>
+          <a:fontRef idx="minor">
+            <a:schemeClr val="lt1"/>
+          </a:fontRef>
+        </p:style>
+        <p:txBody>
+          <a:bodyPr rtlCol="0" anchor="ctr"/>
+          <a:lstStyle/>
+          <a:p>
+            <a:pPr algn="ctr"/>
+            <a:endParaRPr lang="en-US"/>
+          </a:p>
+        </p:txBody>
+      </p:sp>
+      <p:cxnSp>
+        <p:nvCxnSpPr>
+          <p:cNvPr id="25" name="Straight Arrow Connector 24">
+            <a:extLst>
+              <a:ext uri="{FF2B5EF4-FFF2-40B4-BE49-F238E27FC236}">
+                <a16:creationId xmlns:a16="http://schemas.microsoft.com/office/drawing/2014/main" id="{3907D34F-99FE-B715-0B24-FE2CD9D49C5D}"/>
+              </a:ext>
+            </a:extLst>
+          </p:cNvPr>
+          <p:cNvCxnSpPr>
+            <a:cxnSpLocks/>
+          </p:cNvCxnSpPr>
+          <p:nvPr/>
+        </p:nvCxnSpPr>
+        <p:spPr>
+          <a:xfrm>
+            <a:off x="5712075" y="2675504"/>
+            <a:ext cx="0" cy="316467"/>
+          </a:xfrm>
+          <a:prstGeom prst="straightConnector1">
+            <a:avLst/>
+          </a:prstGeom>
+          <a:ln w="28575">
+            <a:solidFill>
+              <a:schemeClr val="accent1"/>
+            </a:solidFill>
+            <a:tailEnd type="triangle"/>
+          </a:ln>
+        </p:spPr>
+        <p:style>
+          <a:lnRef idx="2">
+            <a:schemeClr val="accent1"/>
+          </a:lnRef>
+          <a:fillRef idx="0">
+            <a:schemeClr val="accent1"/>
+          </a:fillRef>
+          <a:effectRef idx="1">
+            <a:schemeClr val="accent1"/>
+          </a:effectRef>
+          <a:fontRef idx="minor">
+            <a:schemeClr val="tx1"/>
+          </a:fontRef>
+        </p:style>
+      </p:cxnSp>
+      <p:sp>
+        <p:nvSpPr>
+          <p:cNvPr id="26" name="Data 25">
+            <a:extLst>
+              <a:ext uri="{FF2B5EF4-FFF2-40B4-BE49-F238E27FC236}">
+                <a16:creationId xmlns:a16="http://schemas.microsoft.com/office/drawing/2014/main" id="{BB1F957E-433A-8E5C-2D50-E135A2EAA416}"/>
+              </a:ext>
+            </a:extLst>
+          </p:cNvPr>
+          <p:cNvSpPr/>
+          <p:nvPr/>
+        </p:nvSpPr>
+        <p:spPr>
+          <a:xfrm>
+            <a:off x="4583846" y="3006292"/>
+            <a:ext cx="2256459" cy="853898"/>
+          </a:xfrm>
+          <a:prstGeom prst="flowChartInputOutput">
+            <a:avLst/>
+          </a:prstGeom>
+          <a:solidFill>
+            <a:srgbClr val="FFFF00"/>
+          </a:solidFill>
+        </p:spPr>
+        <p:style>
+          <a:lnRef idx="2">
+            <a:schemeClr val="accent1">
+              <a:shade val="15000"/>
+            </a:schemeClr>
+          </a:lnRef>
+          <a:fillRef idx="1">
+            <a:schemeClr val="accent1"/>
+          </a:fillRef>
+          <a:effectRef idx="0">
+            <a:schemeClr val="accent1"/>
+          </a:effectRef>
+          <a:fontRef idx="minor">
+            <a:schemeClr val="lt1"/>
+          </a:fontRef>
+        </p:style>
+        <p:txBody>
+          <a:bodyPr rtlCol="0" anchor="ctr"/>
+          <a:lstStyle/>
+          <a:p>
+            <a:pPr algn="ctr"/>
+            <a:r>
+              <a:rPr lang="en-US" sz="1200" dirty="0">
+                <a:solidFill>
+                  <a:sysClr val="windowText" lastClr="000000"/>
+                </a:solidFill>
+              </a:rPr>
+              <a:t>PORTC = counter</a:t>
+            </a:r>
+          </a:p>
+        </p:txBody>
+      </p:sp>
+      <p:sp>
+        <p:nvSpPr>
+          <p:cNvPr id="29" name="Predefined Process 28">
+            <a:extLst>
+              <a:ext uri="{FF2B5EF4-FFF2-40B4-BE49-F238E27FC236}">
+                <a16:creationId xmlns:a16="http://schemas.microsoft.com/office/drawing/2014/main" id="{CA4AB899-675C-9BF6-40EC-9B2D150D69E1}"/>
+              </a:ext>
+            </a:extLst>
+          </p:cNvPr>
+          <p:cNvSpPr/>
+          <p:nvPr/>
+        </p:nvSpPr>
+        <p:spPr>
+          <a:xfrm>
+            <a:off x="4589803" y="6618399"/>
+            <a:ext cx="2244545" cy="827314"/>
+          </a:xfrm>
+          <a:prstGeom prst="flowChartPredefinedProcess">
+            <a:avLst/>
+          </a:prstGeom>
+          <a:solidFill>
+            <a:schemeClr val="accent6"/>
+          </a:solidFill>
+        </p:spPr>
+        <p:style>
+          <a:lnRef idx="2">
+            <a:schemeClr val="accent1">
+              <a:shade val="15000"/>
+            </a:schemeClr>
+          </a:lnRef>
+          <a:fillRef idx="1">
+            <a:schemeClr val="accent1"/>
+          </a:fillRef>
+          <a:effectRef idx="0">
+            <a:schemeClr val="accent1"/>
+          </a:effectRef>
+          <a:fontRef idx="minor">
+            <a:schemeClr val="lt1"/>
+          </a:fontRef>
+        </p:style>
+        <p:txBody>
+          <a:bodyPr rtlCol="0" anchor="ctr"/>
+          <a:lstStyle/>
+          <a:p>
+            <a:pPr algn="ctr"/>
+            <a:r>
+              <a:rPr lang="en-US" sz="1600" dirty="0"/>
+              <a:t>Delay 1 second</a:t>
+            </a:r>
+          </a:p>
+        </p:txBody>
+      </p:sp>
+      <p:cxnSp>
+        <p:nvCxnSpPr>
+          <p:cNvPr id="30" name="Straight Arrow Connector 29">
+            <a:extLst>
+              <a:ext uri="{FF2B5EF4-FFF2-40B4-BE49-F238E27FC236}">
+                <a16:creationId xmlns:a16="http://schemas.microsoft.com/office/drawing/2014/main" id="{431D8A51-D4E2-DEA6-FFB2-3D38A90C16F5}"/>
+              </a:ext>
+            </a:extLst>
+          </p:cNvPr>
+          <p:cNvCxnSpPr>
+            <a:cxnSpLocks/>
+          </p:cNvCxnSpPr>
+          <p:nvPr/>
+        </p:nvCxnSpPr>
+        <p:spPr>
+          <a:xfrm>
+            <a:off x="5712075" y="3853434"/>
+            <a:ext cx="0" cy="316467"/>
+          </a:xfrm>
+          <a:prstGeom prst="straightConnector1">
+            <a:avLst/>
+          </a:prstGeom>
+          <a:ln w="28575">
+            <a:solidFill>
+              <a:schemeClr val="accent1"/>
+            </a:solidFill>
+            <a:tailEnd type="triangle"/>
+          </a:ln>
+        </p:spPr>
+        <p:style>
+          <a:lnRef idx="2">
+            <a:schemeClr val="accent1"/>
+          </a:lnRef>
+          <a:fillRef idx="0">
+            <a:schemeClr val="accent1"/>
+          </a:fillRef>
+          <a:effectRef idx="1">
+            <a:schemeClr val="accent1"/>
+          </a:effectRef>
+          <a:fontRef idx="minor">
+            <a:schemeClr val="tx1"/>
+          </a:fontRef>
+        </p:style>
+      </p:cxnSp>
+      <p:cxnSp>
+        <p:nvCxnSpPr>
+          <p:cNvPr id="31" name="Straight Arrow Connector 30">
+            <a:extLst>
+              <a:ext uri="{FF2B5EF4-FFF2-40B4-BE49-F238E27FC236}">
+                <a16:creationId xmlns:a16="http://schemas.microsoft.com/office/drawing/2014/main" id="{5DEDFC57-0E7A-9C1E-4168-765BA6626D23}"/>
+              </a:ext>
+            </a:extLst>
+          </p:cNvPr>
+          <p:cNvCxnSpPr>
+            <a:cxnSpLocks/>
+          </p:cNvCxnSpPr>
+          <p:nvPr/>
+        </p:nvCxnSpPr>
+        <p:spPr>
+          <a:xfrm>
+            <a:off x="5712075" y="5139250"/>
+            <a:ext cx="0" cy="316467"/>
+          </a:xfrm>
+          <a:prstGeom prst="straightConnector1">
+            <a:avLst/>
+          </a:prstGeom>
+          <a:ln w="28575">
+            <a:solidFill>
+              <a:schemeClr val="accent1"/>
+            </a:solidFill>
+            <a:tailEnd type="triangle"/>
+          </a:ln>
+        </p:spPr>
+        <p:style>
+          <a:lnRef idx="2">
+            <a:schemeClr val="accent1"/>
+          </a:lnRef>
+          <a:fillRef idx="0">
+            <a:schemeClr val="accent1"/>
+          </a:fillRef>
+          <a:effectRef idx="1">
+            <a:schemeClr val="accent1"/>
+          </a:effectRef>
+          <a:fontRef idx="minor">
+            <a:schemeClr val="tx1"/>
+          </a:fontRef>
+        </p:style>
+      </p:cxnSp>
+      <p:cxnSp>
+        <p:nvCxnSpPr>
+          <p:cNvPr id="33" name="Straight Arrow Connector 32">
+            <a:extLst>
+              <a:ext uri="{FF2B5EF4-FFF2-40B4-BE49-F238E27FC236}">
+                <a16:creationId xmlns:a16="http://schemas.microsoft.com/office/drawing/2014/main" id="{5C540854-C471-6DD3-863D-3D1904959FEA}"/>
+              </a:ext>
+            </a:extLst>
+          </p:cNvPr>
+          <p:cNvCxnSpPr>
+            <a:cxnSpLocks/>
+          </p:cNvCxnSpPr>
+          <p:nvPr/>
+        </p:nvCxnSpPr>
+        <p:spPr>
+          <a:xfrm>
+            <a:off x="5712075" y="7445714"/>
+            <a:ext cx="0" cy="316467"/>
+          </a:xfrm>
+          <a:prstGeom prst="straightConnector1">
+            <a:avLst/>
+          </a:prstGeom>
+          <a:ln w="28575">
+            <a:solidFill>
+              <a:schemeClr val="accent1"/>
+            </a:solidFill>
+            <a:tailEnd type="triangle"/>
+          </a:ln>
+        </p:spPr>
+        <p:style>
+          <a:lnRef idx="2">
+            <a:schemeClr val="accent1"/>
+          </a:lnRef>
+          <a:fillRef idx="0">
+            <a:schemeClr val="accent1"/>
+          </a:fillRef>
+          <a:effectRef idx="1">
+            <a:schemeClr val="accent1"/>
+          </a:effectRef>
+          <a:fontRef idx="minor">
+            <a:schemeClr val="tx1"/>
+          </a:fontRef>
+        </p:style>
+      </p:cxnSp>
+      <p:sp>
+        <p:nvSpPr>
+          <p:cNvPr id="34" name="Connector 33">
+            <a:extLst>
+              <a:ext uri="{FF2B5EF4-FFF2-40B4-BE49-F238E27FC236}">
+                <a16:creationId xmlns:a16="http://schemas.microsoft.com/office/drawing/2014/main" id="{ADC5EAE4-0BAF-6674-2E5E-9DA1115DD679}"/>
+              </a:ext>
+            </a:extLst>
+          </p:cNvPr>
+          <p:cNvSpPr/>
+          <p:nvPr/>
+        </p:nvSpPr>
+        <p:spPr>
+          <a:xfrm>
+            <a:off x="5527018" y="7754238"/>
+            <a:ext cx="370115" cy="370115"/>
+          </a:xfrm>
+          <a:prstGeom prst="flowChartConnector">
+            <a:avLst/>
+          </a:prstGeom>
+          <a:solidFill>
+            <a:schemeClr val="bg1"/>
+          </a:solidFill>
+        </p:spPr>
+        <p:style>
+          <a:lnRef idx="2">
+            <a:schemeClr val="accent1">
+              <a:shade val="15000"/>
+            </a:schemeClr>
+          </a:lnRef>
+          <a:fillRef idx="1">
+            <a:schemeClr val="accent1"/>
+          </a:fillRef>
+          <a:effectRef idx="0">
+            <a:schemeClr val="accent1"/>
+          </a:effectRef>
+          <a:fontRef idx="minor">
+            <a:schemeClr val="lt1"/>
+          </a:fontRef>
+        </p:style>
+        <p:txBody>
+          <a:bodyPr rtlCol="0" anchor="ctr"/>
+          <a:lstStyle/>
+          <a:p>
+            <a:pPr algn="ctr"/>
+            <a:endParaRPr lang="en-US"/>
+          </a:p>
+        </p:txBody>
+      </p:sp>
+      <p:sp>
+        <p:nvSpPr>
+          <p:cNvPr id="36" name="Process 35">
+            <a:extLst>
+              <a:ext uri="{FF2B5EF4-FFF2-40B4-BE49-F238E27FC236}">
+                <a16:creationId xmlns:a16="http://schemas.microsoft.com/office/drawing/2014/main" id="{2ED242CF-5D6D-3C73-B452-6B24EFBDB9F4}"/>
+              </a:ext>
+            </a:extLst>
+          </p:cNvPr>
+          <p:cNvSpPr/>
+          <p:nvPr/>
+        </p:nvSpPr>
+        <p:spPr>
+          <a:xfrm>
+            <a:off x="4650740" y="5446236"/>
+            <a:ext cx="2122671" cy="753798"/>
+          </a:xfrm>
+          <a:prstGeom prst="flowChartProcess">
+            <a:avLst/>
+          </a:prstGeom>
+          <a:solidFill>
+            <a:schemeClr val="accent4"/>
+          </a:solidFill>
+          <a:ln>
+            <a:solidFill>
+              <a:schemeClr val="accent4"/>
+            </a:solidFill>
+          </a:ln>
+        </p:spPr>
+        <p:style>
+          <a:lnRef idx="2">
+            <a:schemeClr val="accent1">
+              <a:shade val="15000"/>
+            </a:schemeClr>
+          </a:lnRef>
+          <a:fillRef idx="1">
+            <a:schemeClr val="accent1"/>
+          </a:fillRef>
+          <a:effectRef idx="0">
+            <a:schemeClr val="accent1"/>
+          </a:effectRef>
+          <a:fontRef idx="minor">
+            <a:schemeClr val="lt1"/>
+          </a:fontRef>
+        </p:style>
+        <p:txBody>
+          <a:bodyPr rtlCol="0" anchor="ctr"/>
+          <a:lstStyle/>
+          <a:p>
+            <a:pPr algn="ctr"/>
+            <a:r>
+              <a:rPr lang="en-US" dirty="0"/>
+              <a:t>Increment counter</a:t>
+            </a:r>
+          </a:p>
+        </p:txBody>
+      </p:sp>
+      <p:sp>
+        <p:nvSpPr>
+          <p:cNvPr id="55" name="TextBox 54">
+            <a:extLst>
+              <a:ext uri="{FF2B5EF4-FFF2-40B4-BE49-F238E27FC236}">
+                <a16:creationId xmlns:a16="http://schemas.microsoft.com/office/drawing/2014/main" id="{9F3E5AC1-FA6D-7E0B-E400-F89A22A7AF9B}"/>
+              </a:ext>
+            </a:extLst>
+          </p:cNvPr>
+          <p:cNvSpPr txBox="1"/>
+          <p:nvPr/>
+        </p:nvSpPr>
+        <p:spPr>
+          <a:xfrm>
+            <a:off x="5221379" y="6263290"/>
+            <a:ext cx="309700" cy="369332"/>
+          </a:xfrm>
+          <a:prstGeom prst="rect">
+            <a:avLst/>
+          </a:prstGeom>
+          <a:noFill/>
+        </p:spPr>
+        <p:txBody>
+          <a:bodyPr wrap="none" rtlCol="0">
+            <a:spAutoFit/>
+          </a:bodyPr>
+          <a:lstStyle/>
+          <a:p>
+            <a:r>
+              <a:rPr lang="en-US" dirty="0"/>
+              <a:t>Y</a:t>
+            </a:r>
+          </a:p>
+        </p:txBody>
+      </p:sp>
+      <p:sp>
+        <p:nvSpPr>
+          <p:cNvPr id="2" name="TextBox 1">
+            <a:extLst>
+              <a:ext uri="{FF2B5EF4-FFF2-40B4-BE49-F238E27FC236}">
+                <a16:creationId xmlns:a16="http://schemas.microsoft.com/office/drawing/2014/main" id="{36CD87F0-19FE-43C3-901C-D223F9DAAEB3}"/>
+              </a:ext>
+            </a:extLst>
+          </p:cNvPr>
+          <p:cNvSpPr txBox="1"/>
+          <p:nvPr/>
+        </p:nvSpPr>
+        <p:spPr>
+          <a:xfrm>
+            <a:off x="991892" y="480447"/>
+            <a:ext cx="726096" cy="369332"/>
+          </a:xfrm>
+          <a:prstGeom prst="rect">
+            <a:avLst/>
+          </a:prstGeom>
+          <a:noFill/>
+        </p:spPr>
+        <p:txBody>
+          <a:bodyPr wrap="none" rtlCol="0">
+            <a:spAutoFit/>
+          </a:bodyPr>
+          <a:lstStyle/>
+          <a:p>
+            <a:r>
+              <a:rPr lang="en-US" dirty="0"/>
+              <a:t>Lab 2</a:t>
+            </a:r>
+          </a:p>
+        </p:txBody>
+      </p:sp>
+      <p:sp>
+        <p:nvSpPr>
+          <p:cNvPr id="16" name="Decision 15">
+            <a:extLst>
+              <a:ext uri="{FF2B5EF4-FFF2-40B4-BE49-F238E27FC236}">
+                <a16:creationId xmlns:a16="http://schemas.microsoft.com/office/drawing/2014/main" id="{796B7463-D923-3EBF-5CCE-223550F70F08}"/>
+              </a:ext>
+            </a:extLst>
+          </p:cNvPr>
+          <p:cNvSpPr/>
+          <p:nvPr/>
+        </p:nvSpPr>
+        <p:spPr>
+          <a:xfrm>
+            <a:off x="4825533" y="4168714"/>
+            <a:ext cx="1773085" cy="970536"/>
+          </a:xfrm>
+          <a:prstGeom prst="flowChartDecision">
+            <a:avLst/>
+          </a:prstGeom>
+          <a:solidFill>
+            <a:schemeClr val="accent5"/>
+          </a:solidFill>
+        </p:spPr>
+        <p:style>
+          <a:lnRef idx="2">
+            <a:schemeClr val="accent1">
+              <a:shade val="15000"/>
+            </a:schemeClr>
+          </a:lnRef>
+          <a:fillRef idx="1">
+            <a:schemeClr val="accent1"/>
+          </a:fillRef>
+          <a:effectRef idx="0">
+            <a:schemeClr val="accent1"/>
+          </a:effectRef>
+          <a:fontRef idx="minor">
+            <a:schemeClr val="lt1"/>
+          </a:fontRef>
+        </p:style>
+        <p:txBody>
+          <a:bodyPr rtlCol="0" anchor="ctr"/>
+          <a:lstStyle/>
+          <a:p>
+            <a:pPr algn="ctr"/>
+            <a:r>
+              <a:rPr lang="en-US" sz="1400" dirty="0"/>
+              <a:t>PIND &amp;&amp; 0b00000100 != 0</a:t>
+            </a:r>
+          </a:p>
+        </p:txBody>
+      </p:sp>
+      <p:cxnSp>
+        <p:nvCxnSpPr>
+          <p:cNvPr id="17" name="Straight Arrow Connector 16">
+            <a:extLst>
+              <a:ext uri="{FF2B5EF4-FFF2-40B4-BE49-F238E27FC236}">
+                <a16:creationId xmlns:a16="http://schemas.microsoft.com/office/drawing/2014/main" id="{ABEC81F5-3566-9FB5-39B7-C2A319729852}"/>
+              </a:ext>
+            </a:extLst>
+          </p:cNvPr>
+          <p:cNvCxnSpPr>
+            <a:cxnSpLocks/>
+          </p:cNvCxnSpPr>
+          <p:nvPr/>
+        </p:nvCxnSpPr>
+        <p:spPr>
+          <a:xfrm flipH="1">
+            <a:off x="5712075" y="6408359"/>
+            <a:ext cx="1495559" cy="0"/>
+          </a:xfrm>
+          <a:prstGeom prst="straightConnector1">
+            <a:avLst/>
+          </a:prstGeom>
+          <a:ln w="28575">
+            <a:solidFill>
+              <a:schemeClr val="accent1"/>
+            </a:solidFill>
+            <a:tailEnd type="triangle"/>
+          </a:ln>
+        </p:spPr>
+        <p:style>
+          <a:lnRef idx="2">
+            <a:schemeClr val="accent1"/>
+          </a:lnRef>
+          <a:fillRef idx="0">
+            <a:schemeClr val="accent1"/>
+          </a:fillRef>
+          <a:effectRef idx="1">
+            <a:schemeClr val="accent1"/>
+          </a:effectRef>
+          <a:fontRef idx="minor">
+            <a:schemeClr val="tx1"/>
+          </a:fontRef>
+        </p:style>
+      </p:cxnSp>
+      <p:cxnSp>
+        <p:nvCxnSpPr>
+          <p:cNvPr id="18" name="Straight Arrow Connector 17">
+            <a:extLst>
+              <a:ext uri="{FF2B5EF4-FFF2-40B4-BE49-F238E27FC236}">
+                <a16:creationId xmlns:a16="http://schemas.microsoft.com/office/drawing/2014/main" id="{47021B64-1FE3-46BB-32D9-BA6FD511F058}"/>
+              </a:ext>
+            </a:extLst>
+          </p:cNvPr>
+          <p:cNvCxnSpPr>
+            <a:cxnSpLocks/>
+          </p:cNvCxnSpPr>
+          <p:nvPr/>
+        </p:nvCxnSpPr>
+        <p:spPr>
+          <a:xfrm flipH="1">
+            <a:off x="7197029" y="4669613"/>
+            <a:ext cx="10605" cy="1757006"/>
+          </a:xfrm>
+          <a:prstGeom prst="straightConnector1">
+            <a:avLst/>
+          </a:prstGeom>
+          <a:ln w="28575">
+            <a:solidFill>
+              <a:schemeClr val="accent1"/>
+            </a:solidFill>
+            <a:headEnd type="none" w="med" len="med"/>
+            <a:tailEnd type="none" w="med" len="med"/>
+          </a:ln>
+        </p:spPr>
+        <p:style>
+          <a:lnRef idx="2">
+            <a:schemeClr val="accent1"/>
+          </a:lnRef>
+          <a:fillRef idx="0">
+            <a:schemeClr val="accent1"/>
+          </a:fillRef>
+          <a:effectRef idx="1">
+            <a:schemeClr val="accent1"/>
+          </a:effectRef>
+          <a:fontRef idx="minor">
+            <a:schemeClr val="tx1"/>
+          </a:fontRef>
+        </p:style>
+      </p:cxnSp>
+      <p:sp>
+        <p:nvSpPr>
+          <p:cNvPr id="19" name="TextBox 18">
+            <a:extLst>
+              <a:ext uri="{FF2B5EF4-FFF2-40B4-BE49-F238E27FC236}">
+                <a16:creationId xmlns:a16="http://schemas.microsoft.com/office/drawing/2014/main" id="{AE164B6A-A452-44E3-448D-06B1BC8C7691}"/>
+              </a:ext>
+            </a:extLst>
+          </p:cNvPr>
+          <p:cNvSpPr txBox="1"/>
+          <p:nvPr/>
+        </p:nvSpPr>
+        <p:spPr>
+          <a:xfrm>
+            <a:off x="6564475" y="4274908"/>
+            <a:ext cx="348172" cy="369332"/>
+          </a:xfrm>
+          <a:prstGeom prst="rect">
+            <a:avLst/>
+          </a:prstGeom>
+          <a:noFill/>
+        </p:spPr>
+        <p:txBody>
+          <a:bodyPr wrap="none" rtlCol="0">
+            <a:spAutoFit/>
+          </a:bodyPr>
+          <a:lstStyle/>
+          <a:p>
+            <a:r>
+              <a:rPr lang="en-US" dirty="0"/>
+              <a:t>N</a:t>
+            </a:r>
+          </a:p>
+        </p:txBody>
+      </p:sp>
+      <p:cxnSp>
+        <p:nvCxnSpPr>
+          <p:cNvPr id="20" name="Straight Arrow Connector 19">
+            <a:extLst>
+              <a:ext uri="{FF2B5EF4-FFF2-40B4-BE49-F238E27FC236}">
+                <a16:creationId xmlns:a16="http://schemas.microsoft.com/office/drawing/2014/main" id="{4A50C021-FD1A-94F0-4798-775C5FB245DB}"/>
+              </a:ext>
+            </a:extLst>
+          </p:cNvPr>
+          <p:cNvCxnSpPr>
+            <a:cxnSpLocks/>
+          </p:cNvCxnSpPr>
+          <p:nvPr/>
+        </p:nvCxnSpPr>
+        <p:spPr>
+          <a:xfrm>
+            <a:off x="6544969" y="4669613"/>
+            <a:ext cx="662665" cy="626"/>
+          </a:xfrm>
+          <a:prstGeom prst="straightConnector1">
+            <a:avLst/>
+          </a:prstGeom>
+          <a:ln w="28575">
+            <a:solidFill>
+              <a:schemeClr val="accent1"/>
+            </a:solidFill>
+            <a:headEnd type="none" w="med" len="med"/>
+            <a:tailEnd type="none" w="med" len="med"/>
+          </a:ln>
+        </p:spPr>
+        <p:style>
+          <a:lnRef idx="2">
+            <a:schemeClr val="accent1"/>
+          </a:lnRef>
+          <a:fillRef idx="0">
+            <a:schemeClr val="accent1"/>
+          </a:fillRef>
+          <a:effectRef idx="1">
+            <a:schemeClr val="accent1"/>
+          </a:effectRef>
+          <a:fontRef idx="minor">
+            <a:schemeClr val="tx1"/>
+          </a:fontRef>
+        </p:style>
+      </p:cxnSp>
+      <p:cxnSp>
+        <p:nvCxnSpPr>
+          <p:cNvPr id="23" name="Straight Arrow Connector 22">
+            <a:extLst>
+              <a:ext uri="{FF2B5EF4-FFF2-40B4-BE49-F238E27FC236}">
+                <a16:creationId xmlns:a16="http://schemas.microsoft.com/office/drawing/2014/main" id="{6D159CEA-71D9-66AA-D65E-24BA8295E9D6}"/>
+              </a:ext>
+            </a:extLst>
+          </p:cNvPr>
+          <p:cNvCxnSpPr>
+            <a:cxnSpLocks/>
+            <a:endCxn id="29" idx="0"/>
+          </p:cNvCxnSpPr>
+          <p:nvPr/>
+        </p:nvCxnSpPr>
+        <p:spPr>
+          <a:xfrm>
+            <a:off x="5712075" y="6223301"/>
+            <a:ext cx="1" cy="395098"/>
+          </a:xfrm>
+          <a:prstGeom prst="straightConnector1">
+            <a:avLst/>
+          </a:prstGeom>
+          <a:ln w="28575">
+            <a:solidFill>
+              <a:schemeClr val="accent1"/>
+            </a:solidFill>
+            <a:tailEnd type="triangle"/>
+          </a:ln>
+        </p:spPr>
+        <p:style>
+          <a:lnRef idx="2">
+            <a:schemeClr val="accent1"/>
+          </a:lnRef>
+          <a:fillRef idx="0">
+            <a:schemeClr val="accent1"/>
+          </a:fillRef>
+          <a:effectRef idx="1">
+            <a:schemeClr val="accent1"/>
+          </a:effectRef>
+          <a:fontRef idx="minor">
+            <a:schemeClr val="tx1"/>
+          </a:fontRef>
+        </p:style>
+      </p:cxnSp>
+      <p:sp>
+        <p:nvSpPr>
+          <p:cNvPr id="37" name="TextBox 36">
+            <a:extLst>
+              <a:ext uri="{FF2B5EF4-FFF2-40B4-BE49-F238E27FC236}">
+                <a16:creationId xmlns:a16="http://schemas.microsoft.com/office/drawing/2014/main" id="{A664AAA0-1567-9827-F0E3-8A6FD895BE79}"/>
+              </a:ext>
+            </a:extLst>
+          </p:cNvPr>
+          <p:cNvSpPr txBox="1"/>
+          <p:nvPr/>
+        </p:nvSpPr>
+        <p:spPr>
+          <a:xfrm>
+            <a:off x="4358838" y="8331931"/>
+            <a:ext cx="2239780" cy="369332"/>
+          </a:xfrm>
+          <a:prstGeom prst="rect">
+            <a:avLst/>
+          </a:prstGeom>
+          <a:noFill/>
+        </p:spPr>
+        <p:txBody>
+          <a:bodyPr wrap="none" rtlCol="0">
+            <a:spAutoFit/>
+          </a:bodyPr>
+          <a:lstStyle/>
+          <a:p>
+            <a:r>
+              <a:rPr lang="en-US" dirty="0"/>
+              <a:t>b) Setup Subprocess</a:t>
+            </a:r>
+          </a:p>
+        </p:txBody>
+      </p:sp>
+    </p:spTree>
+    <p:extLst>
+      <p:ext uri="{BB962C8B-B14F-4D97-AF65-F5344CB8AC3E}">
+        <p14:creationId xmlns:p14="http://schemas.microsoft.com/office/powerpoint/2010/main" val="179390575"/>
       </p:ext>
     </p:extLst>
   </p:cSld>

</xml_diff>

<commit_message>
Added flow charts to lab 3
</commit_message>
<xml_diff>
--- a/website/labs/get_started/pictures/flow-charts.pptx
+++ b/website/labs/get_started/pictures/flow-charts.pptx
@@ -8,6 +8,7 @@
     <p:sldId id="256" r:id="rId2"/>
     <p:sldId id="257" r:id="rId3"/>
     <p:sldId id="258" r:id="rId4"/>
+    <p:sldId id="259" r:id="rId5"/>
   </p:sldIdLst>
   <p:sldSz cx="12801600" cy="9601200" type="A3"/>
   <p:notesSz cx="6858000" cy="9144000"/>
@@ -245,7 +246,7 @@
           <a:p>
             <a:fld id="{B85DF64A-A64B-9B40-9390-C6B9C8EAFEF9}" type="datetimeFigureOut">
               <a:rPr lang="en-US" smtClean="0"/>
-              <a:t>10/23/24</a:t>
+              <a:t>10/25/24</a:t>
             </a:fld>
             <a:endParaRPr lang="en-US"/>
           </a:p>
@@ -415,7 +416,7 @@
           <a:p>
             <a:fld id="{B85DF64A-A64B-9B40-9390-C6B9C8EAFEF9}" type="datetimeFigureOut">
               <a:rPr lang="en-US" smtClean="0"/>
-              <a:t>10/23/24</a:t>
+              <a:t>10/25/24</a:t>
             </a:fld>
             <a:endParaRPr lang="en-US"/>
           </a:p>
@@ -595,7 +596,7 @@
           <a:p>
             <a:fld id="{B85DF64A-A64B-9B40-9390-C6B9C8EAFEF9}" type="datetimeFigureOut">
               <a:rPr lang="en-US" smtClean="0"/>
-              <a:t>10/23/24</a:t>
+              <a:t>10/25/24</a:t>
             </a:fld>
             <a:endParaRPr lang="en-US"/>
           </a:p>
@@ -765,7 +766,7 @@
           <a:p>
             <a:fld id="{B85DF64A-A64B-9B40-9390-C6B9C8EAFEF9}" type="datetimeFigureOut">
               <a:rPr lang="en-US" smtClean="0"/>
-              <a:t>10/23/24</a:t>
+              <a:t>10/25/24</a:t>
             </a:fld>
             <a:endParaRPr lang="en-US"/>
           </a:p>
@@ -1011,7 +1012,7 @@
           <a:p>
             <a:fld id="{B85DF64A-A64B-9B40-9390-C6B9C8EAFEF9}" type="datetimeFigureOut">
               <a:rPr lang="en-US" smtClean="0"/>
-              <a:t>10/23/24</a:t>
+              <a:t>10/25/24</a:t>
             </a:fld>
             <a:endParaRPr lang="en-US"/>
           </a:p>
@@ -1243,7 +1244,7 @@
           <a:p>
             <a:fld id="{B85DF64A-A64B-9B40-9390-C6B9C8EAFEF9}" type="datetimeFigureOut">
               <a:rPr lang="en-US" smtClean="0"/>
-              <a:t>10/23/24</a:t>
+              <a:t>10/25/24</a:t>
             </a:fld>
             <a:endParaRPr lang="en-US"/>
           </a:p>
@@ -1610,7 +1611,7 @@
           <a:p>
             <a:fld id="{B85DF64A-A64B-9B40-9390-C6B9C8EAFEF9}" type="datetimeFigureOut">
               <a:rPr lang="en-US" smtClean="0"/>
-              <a:t>10/23/24</a:t>
+              <a:t>10/25/24</a:t>
             </a:fld>
             <a:endParaRPr lang="en-US"/>
           </a:p>
@@ -1728,7 +1729,7 @@
           <a:p>
             <a:fld id="{B85DF64A-A64B-9B40-9390-C6B9C8EAFEF9}" type="datetimeFigureOut">
               <a:rPr lang="en-US" smtClean="0"/>
-              <a:t>10/23/24</a:t>
+              <a:t>10/25/24</a:t>
             </a:fld>
             <a:endParaRPr lang="en-US"/>
           </a:p>
@@ -1823,7 +1824,7 @@
           <a:p>
             <a:fld id="{B85DF64A-A64B-9B40-9390-C6B9C8EAFEF9}" type="datetimeFigureOut">
               <a:rPr lang="en-US" smtClean="0"/>
-              <a:t>10/23/24</a:t>
+              <a:t>10/25/24</a:t>
             </a:fld>
             <a:endParaRPr lang="en-US"/>
           </a:p>
@@ -2100,7 +2101,7 @@
           <a:p>
             <a:fld id="{B85DF64A-A64B-9B40-9390-C6B9C8EAFEF9}" type="datetimeFigureOut">
               <a:rPr lang="en-US" smtClean="0"/>
-              <a:t>10/23/24</a:t>
+              <a:t>10/25/24</a:t>
             </a:fld>
             <a:endParaRPr lang="en-US"/>
           </a:p>
@@ -2357,7 +2358,7 @@
           <a:p>
             <a:fld id="{B85DF64A-A64B-9B40-9390-C6B9C8EAFEF9}" type="datetimeFigureOut">
               <a:rPr lang="en-US" smtClean="0"/>
-              <a:t>10/23/24</a:t>
+              <a:t>10/25/24</a:t>
             </a:fld>
             <a:endParaRPr lang="en-US"/>
           </a:p>
@@ -2570,7 +2571,7 @@
           <a:p>
             <a:fld id="{B85DF64A-A64B-9B40-9390-C6B9C8EAFEF9}" type="datetimeFigureOut">
               <a:rPr lang="en-US" smtClean="0"/>
-              <a:t>10/23/24</a:t>
+              <a:t>10/25/24</a:t>
             </a:fld>
             <a:endParaRPr lang="en-US"/>
           </a:p>
@@ -7619,6 +7620,2016 @@
 </p:sld>
 </file>
 
+<file path=ppt/slides/slide4.xml><?xml version="1.0" encoding="utf-8"?>
+<p:sld xmlns:a="http://schemas.openxmlformats.org/drawingml/2006/main" xmlns:r="http://schemas.openxmlformats.org/officeDocument/2006/relationships" xmlns:p="http://schemas.openxmlformats.org/presentationml/2006/main">
+  <p:cSld>
+    <p:spTree>
+      <p:nvGrpSpPr>
+        <p:cNvPr id="1" name="">
+          <a:extLst>
+            <a:ext uri="{FF2B5EF4-FFF2-40B4-BE49-F238E27FC236}">
+              <a16:creationId xmlns:a16="http://schemas.microsoft.com/office/drawing/2014/main" id="{B5808CFE-54DB-3B20-0B03-D38A73F3E9A5}"/>
+            </a:ext>
+          </a:extLst>
+        </p:cNvPr>
+        <p:cNvGrpSpPr/>
+        <p:nvPr/>
+      </p:nvGrpSpPr>
+      <p:grpSpPr>
+        <a:xfrm>
+          <a:off x="0" y="0"/>
+          <a:ext cx="0" cy="0"/>
+          <a:chOff x="0" y="0"/>
+          <a:chExt cx="0" cy="0"/>
+        </a:xfrm>
+      </p:grpSpPr>
+      <p:sp>
+        <p:nvSpPr>
+          <p:cNvPr id="2" name="TextBox 1">
+            <a:extLst>
+              <a:ext uri="{FF2B5EF4-FFF2-40B4-BE49-F238E27FC236}">
+                <a16:creationId xmlns:a16="http://schemas.microsoft.com/office/drawing/2014/main" id="{73804C1F-46D4-6400-0F2D-6FC50797548F}"/>
+              </a:ext>
+            </a:extLst>
+          </p:cNvPr>
+          <p:cNvSpPr txBox="1"/>
+          <p:nvPr/>
+        </p:nvSpPr>
+        <p:spPr>
+          <a:xfrm>
+            <a:off x="991892" y="480447"/>
+            <a:ext cx="726096" cy="369332"/>
+          </a:xfrm>
+          <a:prstGeom prst="rect">
+            <a:avLst/>
+          </a:prstGeom>
+          <a:noFill/>
+        </p:spPr>
+        <p:txBody>
+          <a:bodyPr wrap="none" rtlCol="0">
+            <a:spAutoFit/>
+          </a:bodyPr>
+          <a:lstStyle/>
+          <a:p>
+            <a:r>
+              <a:rPr lang="en-US" dirty="0"/>
+              <a:t>Lab 3</a:t>
+            </a:r>
+          </a:p>
+        </p:txBody>
+      </p:sp>
+      <p:sp>
+        <p:nvSpPr>
+          <p:cNvPr id="37" name="TextBox 36">
+            <a:extLst>
+              <a:ext uri="{FF2B5EF4-FFF2-40B4-BE49-F238E27FC236}">
+                <a16:creationId xmlns:a16="http://schemas.microsoft.com/office/drawing/2014/main" id="{431F7973-5D96-CCCB-44F3-5EB6850F6E53}"/>
+              </a:ext>
+            </a:extLst>
+          </p:cNvPr>
+          <p:cNvSpPr txBox="1"/>
+          <p:nvPr/>
+        </p:nvSpPr>
+        <p:spPr>
+          <a:xfrm>
+            <a:off x="923710" y="7373303"/>
+            <a:ext cx="1916550" cy="369332"/>
+          </a:xfrm>
+          <a:prstGeom prst="rect">
+            <a:avLst/>
+          </a:prstGeom>
+          <a:noFill/>
+        </p:spPr>
+        <p:txBody>
+          <a:bodyPr wrap="none" rtlCol="0">
+            <a:spAutoFit/>
+          </a:bodyPr>
+          <a:lstStyle/>
+          <a:p>
+            <a:r>
+              <a:rPr lang="en-US" dirty="0"/>
+              <a:t>Loop Subprocess</a:t>
+            </a:r>
+          </a:p>
+        </p:txBody>
+      </p:sp>
+      <p:grpSp>
+        <p:nvGrpSpPr>
+          <p:cNvPr id="79" name="Group 78">
+            <a:extLst>
+              <a:ext uri="{FF2B5EF4-FFF2-40B4-BE49-F238E27FC236}">
+                <a16:creationId xmlns:a16="http://schemas.microsoft.com/office/drawing/2014/main" id="{CDDFB2DA-A6BA-EDBD-6A72-158438978FAD}"/>
+              </a:ext>
+            </a:extLst>
+          </p:cNvPr>
+          <p:cNvGrpSpPr/>
+          <p:nvPr/>
+        </p:nvGrpSpPr>
+        <p:grpSpPr>
+          <a:xfrm>
+            <a:off x="583801" y="2227897"/>
+            <a:ext cx="12782236" cy="5128188"/>
+            <a:chOff x="583801" y="2227897"/>
+            <a:chExt cx="12782236" cy="5128188"/>
+          </a:xfrm>
+        </p:grpSpPr>
+        <p:sp>
+          <p:nvSpPr>
+            <p:cNvPr id="24" name="Connector 23">
+              <a:extLst>
+                <a:ext uri="{FF2B5EF4-FFF2-40B4-BE49-F238E27FC236}">
+                  <a16:creationId xmlns:a16="http://schemas.microsoft.com/office/drawing/2014/main" id="{F88E5B89-3F91-F52B-8C2A-76473BC7B091}"/>
+                </a:ext>
+              </a:extLst>
+            </p:cNvPr>
+            <p:cNvSpPr/>
+            <p:nvPr/>
+          </p:nvSpPr>
+          <p:spPr>
+            <a:xfrm>
+              <a:off x="1532930" y="2227897"/>
+              <a:ext cx="370115" cy="370115"/>
+            </a:xfrm>
+            <a:prstGeom prst="flowChartConnector">
+              <a:avLst/>
+            </a:prstGeom>
+            <a:solidFill>
+              <a:schemeClr val="bg1"/>
+            </a:solidFill>
+          </p:spPr>
+          <p:style>
+            <a:lnRef idx="2">
+              <a:schemeClr val="accent1">
+                <a:shade val="15000"/>
+              </a:schemeClr>
+            </a:lnRef>
+            <a:fillRef idx="1">
+              <a:schemeClr val="accent1"/>
+            </a:fillRef>
+            <a:effectRef idx="0">
+              <a:schemeClr val="accent1"/>
+            </a:effectRef>
+            <a:fontRef idx="minor">
+              <a:schemeClr val="lt1"/>
+            </a:fontRef>
+          </p:style>
+          <p:txBody>
+            <a:bodyPr rtlCol="0" anchor="ctr"/>
+            <a:lstStyle/>
+            <a:p>
+              <a:pPr algn="ctr"/>
+              <a:endParaRPr lang="en-US"/>
+            </a:p>
+          </p:txBody>
+        </p:sp>
+        <p:cxnSp>
+          <p:nvCxnSpPr>
+            <p:cNvPr id="25" name="Straight Arrow Connector 24">
+              <a:extLst>
+                <a:ext uri="{FF2B5EF4-FFF2-40B4-BE49-F238E27FC236}">
+                  <a16:creationId xmlns:a16="http://schemas.microsoft.com/office/drawing/2014/main" id="{F166A567-D82C-29A9-CF11-92965AA69FEE}"/>
+                </a:ext>
+              </a:extLst>
+            </p:cNvPr>
+            <p:cNvCxnSpPr>
+              <a:cxnSpLocks/>
+            </p:cNvCxnSpPr>
+            <p:nvPr/>
+          </p:nvCxnSpPr>
+          <p:spPr>
+            <a:xfrm>
+              <a:off x="1717987" y="2598012"/>
+              <a:ext cx="0" cy="316467"/>
+            </a:xfrm>
+            <a:prstGeom prst="straightConnector1">
+              <a:avLst/>
+            </a:prstGeom>
+            <a:ln w="28575">
+              <a:solidFill>
+                <a:schemeClr val="accent4"/>
+              </a:solidFill>
+              <a:tailEnd type="triangle"/>
+            </a:ln>
+          </p:spPr>
+          <p:style>
+            <a:lnRef idx="2">
+              <a:schemeClr val="accent1"/>
+            </a:lnRef>
+            <a:fillRef idx="0">
+              <a:schemeClr val="accent1"/>
+            </a:fillRef>
+            <a:effectRef idx="1">
+              <a:schemeClr val="accent1"/>
+            </a:effectRef>
+            <a:fontRef idx="minor">
+              <a:schemeClr val="tx1"/>
+            </a:fontRef>
+          </p:style>
+        </p:cxnSp>
+        <p:sp>
+          <p:nvSpPr>
+            <p:cNvPr id="26" name="Data 25">
+              <a:extLst>
+                <a:ext uri="{FF2B5EF4-FFF2-40B4-BE49-F238E27FC236}">
+                  <a16:creationId xmlns:a16="http://schemas.microsoft.com/office/drawing/2014/main" id="{441F923E-4A2D-61DD-EC28-44AF8C2EC5E9}"/>
+                </a:ext>
+              </a:extLst>
+            </p:cNvPr>
+            <p:cNvSpPr/>
+            <p:nvPr/>
+          </p:nvSpPr>
+          <p:spPr>
+            <a:xfrm>
+              <a:off x="589758" y="2928800"/>
+              <a:ext cx="2256459" cy="853898"/>
+            </a:xfrm>
+            <a:prstGeom prst="flowChartInputOutput">
+              <a:avLst/>
+            </a:prstGeom>
+            <a:solidFill>
+              <a:srgbClr val="FFFF00"/>
+            </a:solidFill>
+          </p:spPr>
+          <p:style>
+            <a:lnRef idx="2">
+              <a:schemeClr val="accent1">
+                <a:shade val="15000"/>
+              </a:schemeClr>
+            </a:lnRef>
+            <a:fillRef idx="1">
+              <a:schemeClr val="accent1"/>
+            </a:fillRef>
+            <a:effectRef idx="0">
+              <a:schemeClr val="accent1"/>
+            </a:effectRef>
+            <a:fontRef idx="minor">
+              <a:schemeClr val="lt1"/>
+            </a:fontRef>
+          </p:style>
+          <p:txBody>
+            <a:bodyPr rtlCol="0" anchor="ctr"/>
+            <a:lstStyle/>
+            <a:p>
+              <a:pPr algn="ctr"/>
+              <a:r>
+                <a:rPr lang="en-US" sz="1200" dirty="0">
+                  <a:solidFill>
+                    <a:sysClr val="windowText" lastClr="000000"/>
+                  </a:solidFill>
+                </a:rPr>
+                <a:t>Read ADCVAL</a:t>
+              </a:r>
+            </a:p>
+          </p:txBody>
+        </p:sp>
+        <p:cxnSp>
+          <p:nvCxnSpPr>
+            <p:cNvPr id="30" name="Straight Arrow Connector 29">
+              <a:extLst>
+                <a:ext uri="{FF2B5EF4-FFF2-40B4-BE49-F238E27FC236}">
+                  <a16:creationId xmlns:a16="http://schemas.microsoft.com/office/drawing/2014/main" id="{BDD3DC38-99EE-5FAC-6C47-EC5D86BD8D53}"/>
+                </a:ext>
+              </a:extLst>
+            </p:cNvPr>
+            <p:cNvCxnSpPr>
+              <a:cxnSpLocks/>
+            </p:cNvCxnSpPr>
+            <p:nvPr/>
+          </p:nvCxnSpPr>
+          <p:spPr>
+            <a:xfrm>
+              <a:off x="1717987" y="3775942"/>
+              <a:ext cx="0" cy="316467"/>
+            </a:xfrm>
+            <a:prstGeom prst="straightConnector1">
+              <a:avLst/>
+            </a:prstGeom>
+            <a:ln w="28575">
+              <a:solidFill>
+                <a:schemeClr val="accent4"/>
+              </a:solidFill>
+              <a:tailEnd type="triangle"/>
+            </a:ln>
+          </p:spPr>
+          <p:style>
+            <a:lnRef idx="2">
+              <a:schemeClr val="accent1"/>
+            </a:lnRef>
+            <a:fillRef idx="0">
+              <a:schemeClr val="accent1"/>
+            </a:fillRef>
+            <a:effectRef idx="1">
+              <a:schemeClr val="accent1"/>
+            </a:effectRef>
+            <a:fontRef idx="minor">
+              <a:schemeClr val="tx1"/>
+            </a:fontRef>
+          </p:style>
+        </p:cxnSp>
+        <p:sp>
+          <p:nvSpPr>
+            <p:cNvPr id="34" name="Connector 33">
+              <a:extLst>
+                <a:ext uri="{FF2B5EF4-FFF2-40B4-BE49-F238E27FC236}">
+                  <a16:creationId xmlns:a16="http://schemas.microsoft.com/office/drawing/2014/main" id="{37488A07-34A9-563C-6F92-6197E70B802E}"/>
+                </a:ext>
+              </a:extLst>
+            </p:cNvPr>
+            <p:cNvSpPr/>
+            <p:nvPr/>
+          </p:nvSpPr>
+          <p:spPr>
+            <a:xfrm>
+              <a:off x="1546103" y="6985970"/>
+              <a:ext cx="370115" cy="370115"/>
+            </a:xfrm>
+            <a:prstGeom prst="flowChartConnector">
+              <a:avLst/>
+            </a:prstGeom>
+            <a:solidFill>
+              <a:schemeClr val="bg1"/>
+            </a:solidFill>
+          </p:spPr>
+          <p:style>
+            <a:lnRef idx="2">
+              <a:schemeClr val="accent1">
+                <a:shade val="15000"/>
+              </a:schemeClr>
+            </a:lnRef>
+            <a:fillRef idx="1">
+              <a:schemeClr val="accent1"/>
+            </a:fillRef>
+            <a:effectRef idx="0">
+              <a:schemeClr val="accent1"/>
+            </a:effectRef>
+            <a:fontRef idx="minor">
+              <a:schemeClr val="lt1"/>
+            </a:fontRef>
+          </p:style>
+          <p:txBody>
+            <a:bodyPr rtlCol="0" anchor="ctr"/>
+            <a:lstStyle/>
+            <a:p>
+              <a:pPr algn="ctr"/>
+              <a:endParaRPr lang="en-US"/>
+            </a:p>
+          </p:txBody>
+        </p:sp>
+        <p:sp>
+          <p:nvSpPr>
+            <p:cNvPr id="55" name="TextBox 54">
+              <a:extLst>
+                <a:ext uri="{FF2B5EF4-FFF2-40B4-BE49-F238E27FC236}">
+                  <a16:creationId xmlns:a16="http://schemas.microsoft.com/office/drawing/2014/main" id="{56595D1A-B412-9B4E-05C0-967ADA207046}"/>
+                </a:ext>
+              </a:extLst>
+            </p:cNvPr>
+            <p:cNvSpPr txBox="1"/>
+            <p:nvPr/>
+          </p:nvSpPr>
+          <p:spPr>
+            <a:xfrm>
+              <a:off x="1378080" y="5022495"/>
+              <a:ext cx="309700" cy="369332"/>
+            </a:xfrm>
+            <a:prstGeom prst="rect">
+              <a:avLst/>
+            </a:prstGeom>
+            <a:noFill/>
+          </p:spPr>
+          <p:txBody>
+            <a:bodyPr wrap="none" rtlCol="0">
+              <a:spAutoFit/>
+            </a:bodyPr>
+            <a:lstStyle/>
+            <a:p>
+              <a:r>
+                <a:rPr lang="en-US" dirty="0"/>
+                <a:t>Y</a:t>
+              </a:r>
+            </a:p>
+          </p:txBody>
+        </p:sp>
+        <p:sp>
+          <p:nvSpPr>
+            <p:cNvPr id="16" name="Decision 15">
+              <a:extLst>
+                <a:ext uri="{FF2B5EF4-FFF2-40B4-BE49-F238E27FC236}">
+                  <a16:creationId xmlns:a16="http://schemas.microsoft.com/office/drawing/2014/main" id="{B805EF80-4706-146F-6E5D-E7EA089D3ED9}"/>
+                </a:ext>
+              </a:extLst>
+            </p:cNvPr>
+            <p:cNvSpPr/>
+            <p:nvPr/>
+          </p:nvSpPr>
+          <p:spPr>
+            <a:xfrm>
+              <a:off x="831445" y="4091222"/>
+              <a:ext cx="1773085" cy="970536"/>
+            </a:xfrm>
+            <a:prstGeom prst="flowChartDecision">
+              <a:avLst/>
+            </a:prstGeom>
+            <a:solidFill>
+              <a:schemeClr val="accent5"/>
+            </a:solidFill>
+          </p:spPr>
+          <p:style>
+            <a:lnRef idx="2">
+              <a:schemeClr val="accent1">
+                <a:shade val="15000"/>
+              </a:schemeClr>
+            </a:lnRef>
+            <a:fillRef idx="1">
+              <a:schemeClr val="accent1"/>
+            </a:fillRef>
+            <a:effectRef idx="0">
+              <a:schemeClr val="accent1"/>
+            </a:effectRef>
+            <a:fontRef idx="minor">
+              <a:schemeClr val="lt1"/>
+            </a:fontRef>
+          </p:style>
+          <p:txBody>
+            <a:bodyPr rtlCol="0" anchor="ctr"/>
+            <a:lstStyle/>
+            <a:p>
+              <a:pPr algn="ctr"/>
+              <a:r>
+                <a:rPr lang="en-US" sz="1400" dirty="0" err="1"/>
+                <a:t>ADCval</a:t>
+              </a:r>
+              <a:r>
+                <a:rPr lang="en-US" sz="1400" dirty="0"/>
+                <a:t> &gt;= 854</a:t>
+              </a:r>
+            </a:p>
+          </p:txBody>
+        </p:sp>
+        <p:sp>
+          <p:nvSpPr>
+            <p:cNvPr id="19" name="TextBox 18">
+              <a:extLst>
+                <a:ext uri="{FF2B5EF4-FFF2-40B4-BE49-F238E27FC236}">
+                  <a16:creationId xmlns:a16="http://schemas.microsoft.com/office/drawing/2014/main" id="{9C249899-B3F2-E63B-699F-D22FA9068FC9}"/>
+                </a:ext>
+              </a:extLst>
+            </p:cNvPr>
+            <p:cNvSpPr txBox="1"/>
+            <p:nvPr/>
+          </p:nvSpPr>
+          <p:spPr>
+            <a:xfrm>
+              <a:off x="2570387" y="4197416"/>
+              <a:ext cx="348172" cy="369332"/>
+            </a:xfrm>
+            <a:prstGeom prst="rect">
+              <a:avLst/>
+            </a:prstGeom>
+            <a:noFill/>
+          </p:spPr>
+          <p:txBody>
+            <a:bodyPr wrap="none" rtlCol="0">
+              <a:spAutoFit/>
+            </a:bodyPr>
+            <a:lstStyle/>
+            <a:p>
+              <a:r>
+                <a:rPr lang="en-US" dirty="0"/>
+                <a:t>N</a:t>
+              </a:r>
+            </a:p>
+          </p:txBody>
+        </p:sp>
+        <p:cxnSp>
+          <p:nvCxnSpPr>
+            <p:cNvPr id="20" name="Straight Arrow Connector 19">
+              <a:extLst>
+                <a:ext uri="{FF2B5EF4-FFF2-40B4-BE49-F238E27FC236}">
+                  <a16:creationId xmlns:a16="http://schemas.microsoft.com/office/drawing/2014/main" id="{D33B8096-9770-9767-9794-C46EEE743C83}"/>
+                </a:ext>
+              </a:extLst>
+            </p:cNvPr>
+            <p:cNvCxnSpPr>
+              <a:cxnSpLocks/>
+            </p:cNvCxnSpPr>
+            <p:nvPr/>
+          </p:nvCxnSpPr>
+          <p:spPr>
+            <a:xfrm>
+              <a:off x="2550881" y="4592121"/>
+              <a:ext cx="662665" cy="626"/>
+            </a:xfrm>
+            <a:prstGeom prst="straightConnector1">
+              <a:avLst/>
+            </a:prstGeom>
+            <a:ln w="28575">
+              <a:solidFill>
+                <a:schemeClr val="accent4"/>
+              </a:solidFill>
+              <a:headEnd type="none" w="med" len="med"/>
+              <a:tailEnd type="triangle" w="med" len="med"/>
+            </a:ln>
+          </p:spPr>
+          <p:style>
+            <a:lnRef idx="2">
+              <a:schemeClr val="accent1"/>
+            </a:lnRef>
+            <a:fillRef idx="0">
+              <a:schemeClr val="accent1"/>
+            </a:fillRef>
+            <a:effectRef idx="1">
+              <a:schemeClr val="accent1"/>
+            </a:effectRef>
+            <a:fontRef idx="minor">
+              <a:schemeClr val="tx1"/>
+            </a:fontRef>
+          </p:style>
+        </p:cxnSp>
+        <p:sp>
+          <p:nvSpPr>
+            <p:cNvPr id="4" name="Decision 3">
+              <a:extLst>
+                <a:ext uri="{FF2B5EF4-FFF2-40B4-BE49-F238E27FC236}">
+                  <a16:creationId xmlns:a16="http://schemas.microsoft.com/office/drawing/2014/main" id="{BA0DE84C-2A5A-A6D6-23C3-9B681C5E1263}"/>
+                </a:ext>
+              </a:extLst>
+            </p:cNvPr>
+            <p:cNvSpPr/>
+            <p:nvPr/>
+          </p:nvSpPr>
+          <p:spPr>
+            <a:xfrm>
+              <a:off x="3252552" y="4091222"/>
+              <a:ext cx="1773085" cy="970536"/>
+            </a:xfrm>
+            <a:prstGeom prst="flowChartDecision">
+              <a:avLst/>
+            </a:prstGeom>
+            <a:solidFill>
+              <a:schemeClr val="accent5"/>
+            </a:solidFill>
+          </p:spPr>
+          <p:style>
+            <a:lnRef idx="2">
+              <a:schemeClr val="accent1">
+                <a:shade val="15000"/>
+              </a:schemeClr>
+            </a:lnRef>
+            <a:fillRef idx="1">
+              <a:schemeClr val="accent1"/>
+            </a:fillRef>
+            <a:effectRef idx="0">
+              <a:schemeClr val="accent1"/>
+            </a:effectRef>
+            <a:fontRef idx="minor">
+              <a:schemeClr val="lt1"/>
+            </a:fontRef>
+          </p:style>
+          <p:txBody>
+            <a:bodyPr rtlCol="0" anchor="ctr"/>
+            <a:lstStyle/>
+            <a:p>
+              <a:pPr algn="ctr"/>
+              <a:r>
+                <a:rPr lang="en-US" sz="1400" dirty="0" err="1"/>
+                <a:t>ADCval</a:t>
+              </a:r>
+              <a:r>
+                <a:rPr lang="en-US" sz="1400" dirty="0"/>
+                <a:t> &gt;= 684</a:t>
+              </a:r>
+            </a:p>
+          </p:txBody>
+        </p:sp>
+        <p:cxnSp>
+          <p:nvCxnSpPr>
+            <p:cNvPr id="15" name="Straight Arrow Connector 14">
+              <a:extLst>
+                <a:ext uri="{FF2B5EF4-FFF2-40B4-BE49-F238E27FC236}">
+                  <a16:creationId xmlns:a16="http://schemas.microsoft.com/office/drawing/2014/main" id="{29574792-9CFA-F36F-7E8C-21398BAC7310}"/>
+                </a:ext>
+              </a:extLst>
+            </p:cNvPr>
+            <p:cNvCxnSpPr>
+              <a:cxnSpLocks/>
+            </p:cNvCxnSpPr>
+            <p:nvPr/>
+          </p:nvCxnSpPr>
+          <p:spPr>
+            <a:xfrm>
+              <a:off x="5028297" y="4591495"/>
+              <a:ext cx="662665" cy="626"/>
+            </a:xfrm>
+            <a:prstGeom prst="straightConnector1">
+              <a:avLst/>
+            </a:prstGeom>
+            <a:ln w="28575">
+              <a:solidFill>
+                <a:schemeClr val="accent4"/>
+              </a:solidFill>
+              <a:headEnd type="none" w="med" len="med"/>
+              <a:tailEnd type="triangle" w="med" len="med"/>
+            </a:ln>
+          </p:spPr>
+          <p:style>
+            <a:lnRef idx="2">
+              <a:schemeClr val="accent1"/>
+            </a:lnRef>
+            <a:fillRef idx="0">
+              <a:schemeClr val="accent1"/>
+            </a:fillRef>
+            <a:effectRef idx="1">
+              <a:schemeClr val="accent1"/>
+            </a:effectRef>
+            <a:fontRef idx="minor">
+              <a:schemeClr val="tx1"/>
+            </a:fontRef>
+          </p:style>
+        </p:cxnSp>
+        <p:sp>
+          <p:nvSpPr>
+            <p:cNvPr id="27" name="Decision 26">
+              <a:extLst>
+                <a:ext uri="{FF2B5EF4-FFF2-40B4-BE49-F238E27FC236}">
+                  <a16:creationId xmlns:a16="http://schemas.microsoft.com/office/drawing/2014/main" id="{2CC9C84F-2AEC-F8FC-34DA-A6543AABF4DE}"/>
+                </a:ext>
+              </a:extLst>
+            </p:cNvPr>
+            <p:cNvSpPr/>
+            <p:nvPr/>
+          </p:nvSpPr>
+          <p:spPr>
+            <a:xfrm>
+              <a:off x="8504282" y="4106227"/>
+              <a:ext cx="1773085" cy="970536"/>
+            </a:xfrm>
+            <a:prstGeom prst="flowChartDecision">
+              <a:avLst/>
+            </a:prstGeom>
+            <a:solidFill>
+              <a:schemeClr val="accent5"/>
+            </a:solidFill>
+          </p:spPr>
+          <p:style>
+            <a:lnRef idx="2">
+              <a:schemeClr val="accent1">
+                <a:shade val="15000"/>
+              </a:schemeClr>
+            </a:lnRef>
+            <a:fillRef idx="1">
+              <a:schemeClr val="accent1"/>
+            </a:fillRef>
+            <a:effectRef idx="0">
+              <a:schemeClr val="accent1"/>
+            </a:effectRef>
+            <a:fontRef idx="minor">
+              <a:schemeClr val="lt1"/>
+            </a:fontRef>
+          </p:style>
+          <p:txBody>
+            <a:bodyPr rtlCol="0" anchor="ctr"/>
+            <a:lstStyle/>
+            <a:p>
+              <a:pPr algn="ctr"/>
+              <a:r>
+                <a:rPr lang="en-US" sz="1400" dirty="0" err="1"/>
+                <a:t>ADCval</a:t>
+              </a:r>
+              <a:r>
+                <a:rPr lang="en-US" sz="1400" dirty="0"/>
+                <a:t> &gt;= 171</a:t>
+              </a:r>
+            </a:p>
+          </p:txBody>
+        </p:sp>
+        <p:cxnSp>
+          <p:nvCxnSpPr>
+            <p:cNvPr id="28" name="Straight Arrow Connector 27">
+              <a:extLst>
+                <a:ext uri="{FF2B5EF4-FFF2-40B4-BE49-F238E27FC236}">
+                  <a16:creationId xmlns:a16="http://schemas.microsoft.com/office/drawing/2014/main" id="{4EC28CF6-4B8F-25B8-2706-C804A6869ECD}"/>
+                </a:ext>
+              </a:extLst>
+            </p:cNvPr>
+            <p:cNvCxnSpPr>
+              <a:cxnSpLocks/>
+            </p:cNvCxnSpPr>
+            <p:nvPr/>
+          </p:nvCxnSpPr>
+          <p:spPr>
+            <a:xfrm>
+              <a:off x="7858920" y="4590869"/>
+              <a:ext cx="662665" cy="626"/>
+            </a:xfrm>
+            <a:prstGeom prst="straightConnector1">
+              <a:avLst/>
+            </a:prstGeom>
+            <a:ln w="28575">
+              <a:solidFill>
+                <a:schemeClr val="accent4"/>
+              </a:solidFill>
+              <a:headEnd type="none" w="med" len="med"/>
+              <a:tailEnd type="triangle" w="med" len="med"/>
+            </a:ln>
+          </p:spPr>
+          <p:style>
+            <a:lnRef idx="2">
+              <a:schemeClr val="accent1"/>
+            </a:lnRef>
+            <a:fillRef idx="0">
+              <a:schemeClr val="accent1"/>
+            </a:fillRef>
+            <a:effectRef idx="1">
+              <a:schemeClr val="accent1"/>
+            </a:effectRef>
+            <a:fontRef idx="minor">
+              <a:schemeClr val="tx1"/>
+            </a:fontRef>
+          </p:style>
+        </p:cxnSp>
+        <p:sp>
+          <p:nvSpPr>
+            <p:cNvPr id="32" name="Decision 31">
+              <a:extLst>
+                <a:ext uri="{FF2B5EF4-FFF2-40B4-BE49-F238E27FC236}">
+                  <a16:creationId xmlns:a16="http://schemas.microsoft.com/office/drawing/2014/main" id="{6F433A96-012E-BE2A-5176-28FB5E35BFC3}"/>
+                </a:ext>
+              </a:extLst>
+            </p:cNvPr>
+            <p:cNvSpPr/>
+            <p:nvPr/>
+          </p:nvSpPr>
+          <p:spPr>
+            <a:xfrm>
+              <a:off x="10930287" y="4128600"/>
+              <a:ext cx="1773085" cy="970536"/>
+            </a:xfrm>
+            <a:prstGeom prst="flowChartDecision">
+              <a:avLst/>
+            </a:prstGeom>
+            <a:solidFill>
+              <a:schemeClr val="accent5"/>
+            </a:solidFill>
+          </p:spPr>
+          <p:style>
+            <a:lnRef idx="2">
+              <a:schemeClr val="accent1">
+                <a:shade val="15000"/>
+              </a:schemeClr>
+            </a:lnRef>
+            <a:fillRef idx="1">
+              <a:schemeClr val="accent1"/>
+            </a:fillRef>
+            <a:effectRef idx="0">
+              <a:schemeClr val="accent1"/>
+            </a:effectRef>
+            <a:fontRef idx="minor">
+              <a:schemeClr val="lt1"/>
+            </a:fontRef>
+          </p:style>
+          <p:txBody>
+            <a:bodyPr rtlCol="0" anchor="ctr"/>
+            <a:lstStyle/>
+            <a:p>
+              <a:pPr algn="ctr"/>
+              <a:r>
+                <a:rPr lang="en-US" sz="1400" dirty="0" err="1"/>
+                <a:t>ADCval</a:t>
+              </a:r>
+              <a:r>
+                <a:rPr lang="en-US" sz="1400" dirty="0"/>
+                <a:t> &gt;=1</a:t>
+              </a:r>
+            </a:p>
+          </p:txBody>
+        </p:sp>
+        <p:cxnSp>
+          <p:nvCxnSpPr>
+            <p:cNvPr id="35" name="Straight Arrow Connector 34">
+              <a:extLst>
+                <a:ext uri="{FF2B5EF4-FFF2-40B4-BE49-F238E27FC236}">
+                  <a16:creationId xmlns:a16="http://schemas.microsoft.com/office/drawing/2014/main" id="{C891F5EE-21FD-51AA-DB5C-82F478DB6D99}"/>
+                </a:ext>
+              </a:extLst>
+            </p:cNvPr>
+            <p:cNvCxnSpPr>
+              <a:cxnSpLocks/>
+            </p:cNvCxnSpPr>
+            <p:nvPr/>
+          </p:nvCxnSpPr>
+          <p:spPr>
+            <a:xfrm>
+              <a:off x="10284925" y="4613242"/>
+              <a:ext cx="662665" cy="626"/>
+            </a:xfrm>
+            <a:prstGeom prst="straightConnector1">
+              <a:avLst/>
+            </a:prstGeom>
+            <a:ln w="28575">
+              <a:solidFill>
+                <a:schemeClr val="accent4"/>
+              </a:solidFill>
+              <a:headEnd type="none" w="med" len="med"/>
+              <a:tailEnd type="triangle" w="med" len="med"/>
+            </a:ln>
+          </p:spPr>
+          <p:style>
+            <a:lnRef idx="2">
+              <a:schemeClr val="accent1"/>
+            </a:lnRef>
+            <a:fillRef idx="0">
+              <a:schemeClr val="accent1"/>
+            </a:fillRef>
+            <a:effectRef idx="1">
+              <a:schemeClr val="accent1"/>
+            </a:effectRef>
+            <a:fontRef idx="minor">
+              <a:schemeClr val="tx1"/>
+            </a:fontRef>
+          </p:style>
+        </p:cxnSp>
+        <p:sp>
+          <p:nvSpPr>
+            <p:cNvPr id="39" name="TextBox 38">
+              <a:extLst>
+                <a:ext uri="{FF2B5EF4-FFF2-40B4-BE49-F238E27FC236}">
+                  <a16:creationId xmlns:a16="http://schemas.microsoft.com/office/drawing/2014/main" id="{E9B59E17-4959-A32F-4E65-8886976404E1}"/>
+                </a:ext>
+              </a:extLst>
+            </p:cNvPr>
+            <p:cNvSpPr txBox="1"/>
+            <p:nvPr/>
+          </p:nvSpPr>
+          <p:spPr>
+            <a:xfrm>
+              <a:off x="5028297" y="4207158"/>
+              <a:ext cx="348172" cy="369332"/>
+            </a:xfrm>
+            <a:prstGeom prst="rect">
+              <a:avLst/>
+            </a:prstGeom>
+            <a:noFill/>
+          </p:spPr>
+          <p:txBody>
+            <a:bodyPr wrap="none" rtlCol="0">
+              <a:spAutoFit/>
+            </a:bodyPr>
+            <a:lstStyle/>
+            <a:p>
+              <a:r>
+                <a:rPr lang="en-US" dirty="0"/>
+                <a:t>N</a:t>
+              </a:r>
+            </a:p>
+          </p:txBody>
+        </p:sp>
+        <p:sp>
+          <p:nvSpPr>
+            <p:cNvPr id="41" name="TextBox 40">
+              <a:extLst>
+                <a:ext uri="{FF2B5EF4-FFF2-40B4-BE49-F238E27FC236}">
+                  <a16:creationId xmlns:a16="http://schemas.microsoft.com/office/drawing/2014/main" id="{0ECC312D-6A51-AA90-9FD7-087DC7F81D20}"/>
+                </a:ext>
+              </a:extLst>
+            </p:cNvPr>
+            <p:cNvSpPr txBox="1"/>
+            <p:nvPr/>
+          </p:nvSpPr>
+          <p:spPr>
+            <a:xfrm>
+              <a:off x="7922730" y="4227268"/>
+              <a:ext cx="348172" cy="369332"/>
+            </a:xfrm>
+            <a:prstGeom prst="rect">
+              <a:avLst/>
+            </a:prstGeom>
+            <a:noFill/>
+          </p:spPr>
+          <p:txBody>
+            <a:bodyPr wrap="none" rtlCol="0">
+              <a:spAutoFit/>
+            </a:bodyPr>
+            <a:lstStyle/>
+            <a:p>
+              <a:r>
+                <a:rPr lang="en-US" dirty="0"/>
+                <a:t>N</a:t>
+              </a:r>
+            </a:p>
+          </p:txBody>
+        </p:sp>
+        <p:sp>
+          <p:nvSpPr>
+            <p:cNvPr id="42" name="TextBox 41">
+              <a:extLst>
+                <a:ext uri="{FF2B5EF4-FFF2-40B4-BE49-F238E27FC236}">
+                  <a16:creationId xmlns:a16="http://schemas.microsoft.com/office/drawing/2014/main" id="{86C2CDB7-A7C4-2BE8-381F-13B0811FC653}"/>
+                </a:ext>
+              </a:extLst>
+            </p:cNvPr>
+            <p:cNvSpPr txBox="1"/>
+            <p:nvPr/>
+          </p:nvSpPr>
+          <p:spPr>
+            <a:xfrm>
+              <a:off x="10380640" y="4237010"/>
+              <a:ext cx="348172" cy="369332"/>
+            </a:xfrm>
+            <a:prstGeom prst="rect">
+              <a:avLst/>
+            </a:prstGeom>
+            <a:noFill/>
+          </p:spPr>
+          <p:txBody>
+            <a:bodyPr wrap="none" rtlCol="0">
+              <a:spAutoFit/>
+            </a:bodyPr>
+            <a:lstStyle/>
+            <a:p>
+              <a:r>
+                <a:rPr lang="en-US" dirty="0"/>
+                <a:t>N</a:t>
+              </a:r>
+            </a:p>
+          </p:txBody>
+        </p:sp>
+        <p:sp>
+          <p:nvSpPr>
+            <p:cNvPr id="43" name="TextBox 42">
+              <a:extLst>
+                <a:ext uri="{FF2B5EF4-FFF2-40B4-BE49-F238E27FC236}">
+                  <a16:creationId xmlns:a16="http://schemas.microsoft.com/office/drawing/2014/main" id="{81C1EA18-DD27-3D30-BFC3-9A655994B8BD}"/>
+                </a:ext>
+              </a:extLst>
+            </p:cNvPr>
+            <p:cNvSpPr txBox="1"/>
+            <p:nvPr/>
+          </p:nvSpPr>
+          <p:spPr>
+            <a:xfrm>
+              <a:off x="12838550" y="4246752"/>
+              <a:ext cx="348172" cy="369332"/>
+            </a:xfrm>
+            <a:prstGeom prst="rect">
+              <a:avLst/>
+            </a:prstGeom>
+            <a:noFill/>
+          </p:spPr>
+          <p:txBody>
+            <a:bodyPr wrap="none" rtlCol="0">
+              <a:spAutoFit/>
+            </a:bodyPr>
+            <a:lstStyle/>
+            <a:p>
+              <a:r>
+                <a:rPr lang="en-US" dirty="0"/>
+                <a:t>N</a:t>
+              </a:r>
+            </a:p>
+          </p:txBody>
+        </p:sp>
+        <p:cxnSp>
+          <p:nvCxnSpPr>
+            <p:cNvPr id="44" name="Straight Arrow Connector 43">
+              <a:extLst>
+                <a:ext uri="{FF2B5EF4-FFF2-40B4-BE49-F238E27FC236}">
+                  <a16:creationId xmlns:a16="http://schemas.microsoft.com/office/drawing/2014/main" id="{8E2BFFFB-600B-D85A-EC02-71F88EB19D49}"/>
+                </a:ext>
+              </a:extLst>
+            </p:cNvPr>
+            <p:cNvCxnSpPr>
+              <a:cxnSpLocks/>
+            </p:cNvCxnSpPr>
+            <p:nvPr/>
+          </p:nvCxnSpPr>
+          <p:spPr>
+            <a:xfrm>
+              <a:off x="12703372" y="4613242"/>
+              <a:ext cx="662665" cy="626"/>
+            </a:xfrm>
+            <a:prstGeom prst="straightConnector1">
+              <a:avLst/>
+            </a:prstGeom>
+            <a:ln w="28575">
+              <a:solidFill>
+                <a:schemeClr val="accent4"/>
+              </a:solidFill>
+              <a:headEnd type="none" w="med" len="med"/>
+              <a:tailEnd type="none" w="med" len="med"/>
+            </a:ln>
+          </p:spPr>
+          <p:style>
+            <a:lnRef idx="1">
+              <a:schemeClr val="accent1"/>
+            </a:lnRef>
+            <a:fillRef idx="0">
+              <a:schemeClr val="accent1"/>
+            </a:fillRef>
+            <a:effectRef idx="0">
+              <a:schemeClr val="accent1"/>
+            </a:effectRef>
+            <a:fontRef idx="minor">
+              <a:schemeClr val="tx1"/>
+            </a:fontRef>
+          </p:style>
+        </p:cxnSp>
+        <p:cxnSp>
+          <p:nvCxnSpPr>
+            <p:cNvPr id="46" name="Straight Connector 45">
+              <a:extLst>
+                <a:ext uri="{FF2B5EF4-FFF2-40B4-BE49-F238E27FC236}">
+                  <a16:creationId xmlns:a16="http://schemas.microsoft.com/office/drawing/2014/main" id="{006F697F-AED2-221A-322C-ACCBA3990AC1}"/>
+                </a:ext>
+              </a:extLst>
+            </p:cNvPr>
+            <p:cNvCxnSpPr/>
+            <p:nvPr/>
+          </p:nvCxnSpPr>
+          <p:spPr>
+            <a:xfrm>
+              <a:off x="5951349" y="4576490"/>
+              <a:ext cx="1828800" cy="0"/>
+            </a:xfrm>
+            <a:prstGeom prst="line">
+              <a:avLst/>
+            </a:prstGeom>
+            <a:ln w="28575">
+              <a:solidFill>
+                <a:schemeClr val="accent4"/>
+              </a:solidFill>
+              <a:prstDash val="dash"/>
+            </a:ln>
+          </p:spPr>
+          <p:style>
+            <a:lnRef idx="2">
+              <a:schemeClr val="accent1"/>
+            </a:lnRef>
+            <a:fillRef idx="0">
+              <a:schemeClr val="accent1"/>
+            </a:fillRef>
+            <a:effectRef idx="1">
+              <a:schemeClr val="accent1"/>
+            </a:effectRef>
+            <a:fontRef idx="minor">
+              <a:schemeClr val="tx1"/>
+            </a:fontRef>
+          </p:style>
+        </p:cxnSp>
+        <p:sp>
+          <p:nvSpPr>
+            <p:cNvPr id="47" name="TextBox 46">
+              <a:extLst>
+                <a:ext uri="{FF2B5EF4-FFF2-40B4-BE49-F238E27FC236}">
+                  <a16:creationId xmlns:a16="http://schemas.microsoft.com/office/drawing/2014/main" id="{AFAA8FD8-9D71-8994-CACD-D28F585D3AD1}"/>
+                </a:ext>
+              </a:extLst>
+            </p:cNvPr>
+            <p:cNvSpPr txBox="1"/>
+            <p:nvPr/>
+          </p:nvSpPr>
+          <p:spPr>
+            <a:xfrm>
+              <a:off x="5152515" y="4729804"/>
+              <a:ext cx="4016933" cy="646331"/>
+            </a:xfrm>
+            <a:prstGeom prst="rect">
+              <a:avLst/>
+            </a:prstGeom>
+            <a:noFill/>
+          </p:spPr>
+          <p:txBody>
+            <a:bodyPr wrap="none" rtlCol="0">
+              <a:spAutoFit/>
+            </a:bodyPr>
+            <a:lstStyle/>
+            <a:p>
+              <a:r>
+                <a:rPr lang="en-US" dirty="0"/>
+                <a:t>Some decisions omitted for clarity.</a:t>
+              </a:r>
+            </a:p>
+            <a:p>
+              <a:r>
+                <a:rPr lang="en-US" dirty="0"/>
+                <a:t>Each step is 170 less than the previous</a:t>
+              </a:r>
+            </a:p>
+          </p:txBody>
+        </p:sp>
+        <p:grpSp>
+          <p:nvGrpSpPr>
+            <p:cNvPr id="49" name="Group 48">
+              <a:extLst>
+                <a:ext uri="{FF2B5EF4-FFF2-40B4-BE49-F238E27FC236}">
+                  <a16:creationId xmlns:a16="http://schemas.microsoft.com/office/drawing/2014/main" id="{8F3FDB60-6739-1CA9-3561-A57FE87927D9}"/>
+                </a:ext>
+              </a:extLst>
+            </p:cNvPr>
+            <p:cNvGrpSpPr/>
+            <p:nvPr/>
+          </p:nvGrpSpPr>
+          <p:grpSpPr>
+            <a:xfrm>
+              <a:off x="583801" y="5061758"/>
+              <a:ext cx="2256459" cy="1168981"/>
+              <a:chOff x="583801" y="5061758"/>
+              <a:chExt cx="2256459" cy="1168981"/>
+            </a:xfrm>
+          </p:grpSpPr>
+          <p:cxnSp>
+            <p:nvCxnSpPr>
+              <p:cNvPr id="31" name="Straight Arrow Connector 30">
+                <a:extLst>
+                  <a:ext uri="{FF2B5EF4-FFF2-40B4-BE49-F238E27FC236}">
+                    <a16:creationId xmlns:a16="http://schemas.microsoft.com/office/drawing/2014/main" id="{82C248DF-126F-E398-1B9E-951B69C3D1EB}"/>
+                  </a:ext>
+                </a:extLst>
+              </p:cNvPr>
+              <p:cNvCxnSpPr>
+                <a:cxnSpLocks/>
+              </p:cNvCxnSpPr>
+              <p:nvPr/>
+            </p:nvCxnSpPr>
+            <p:spPr>
+              <a:xfrm>
+                <a:off x="1717987" y="5061758"/>
+                <a:ext cx="0" cy="316467"/>
+              </a:xfrm>
+              <a:prstGeom prst="straightConnector1">
+                <a:avLst/>
+              </a:prstGeom>
+              <a:ln w="28575">
+                <a:solidFill>
+                  <a:schemeClr val="accent4"/>
+                </a:solidFill>
+                <a:tailEnd type="triangle"/>
+              </a:ln>
+            </p:spPr>
+            <p:style>
+              <a:lnRef idx="2">
+                <a:schemeClr val="accent1"/>
+              </a:lnRef>
+              <a:fillRef idx="0">
+                <a:schemeClr val="accent1"/>
+              </a:fillRef>
+              <a:effectRef idx="1">
+                <a:schemeClr val="accent1"/>
+              </a:effectRef>
+              <a:fontRef idx="minor">
+                <a:schemeClr val="tx1"/>
+              </a:fontRef>
+            </p:style>
+          </p:cxnSp>
+          <p:sp>
+            <p:nvSpPr>
+              <p:cNvPr id="48" name="Data 47">
+                <a:extLst>
+                  <a:ext uri="{FF2B5EF4-FFF2-40B4-BE49-F238E27FC236}">
+                    <a16:creationId xmlns:a16="http://schemas.microsoft.com/office/drawing/2014/main" id="{A45E3A43-B889-EF5C-E77E-AC8F0D6EE57B}"/>
+                  </a:ext>
+                </a:extLst>
+              </p:cNvPr>
+              <p:cNvSpPr/>
+              <p:nvPr/>
+            </p:nvSpPr>
+            <p:spPr>
+              <a:xfrm>
+                <a:off x="583801" y="5376841"/>
+                <a:ext cx="2256459" cy="853898"/>
+              </a:xfrm>
+              <a:prstGeom prst="flowChartInputOutput">
+                <a:avLst/>
+              </a:prstGeom>
+              <a:solidFill>
+                <a:srgbClr val="FFFF00"/>
+              </a:solidFill>
+            </p:spPr>
+            <p:style>
+              <a:lnRef idx="2">
+                <a:schemeClr val="accent1">
+                  <a:shade val="15000"/>
+                </a:schemeClr>
+              </a:lnRef>
+              <a:fillRef idx="1">
+                <a:schemeClr val="accent1"/>
+              </a:fillRef>
+              <a:effectRef idx="0">
+                <a:schemeClr val="accent1"/>
+              </a:effectRef>
+              <a:fontRef idx="minor">
+                <a:schemeClr val="lt1"/>
+              </a:fontRef>
+            </p:style>
+            <p:txBody>
+              <a:bodyPr rtlCol="0" anchor="ctr"/>
+              <a:lstStyle/>
+              <a:p>
+                <a:pPr algn="ctr"/>
+                <a:r>
+                  <a:rPr lang="en-US" sz="1200" dirty="0">
+                    <a:solidFill>
+                      <a:sysClr val="windowText" lastClr="000000"/>
+                    </a:solidFill>
+                  </a:rPr>
+                  <a:t>Set PORTC to</a:t>
+                </a:r>
+              </a:p>
+              <a:p>
+                <a:pPr algn="ctr"/>
+                <a:r>
+                  <a:rPr lang="en-US" sz="1200" dirty="0">
+                    <a:solidFill>
+                      <a:sysClr val="windowText" lastClr="000000"/>
+                    </a:solidFill>
+                  </a:rPr>
+                  <a:t>0b00111111</a:t>
+                </a:r>
+              </a:p>
+            </p:txBody>
+          </p:sp>
+        </p:grpSp>
+        <p:grpSp>
+          <p:nvGrpSpPr>
+            <p:cNvPr id="50" name="Group 49">
+              <a:extLst>
+                <a:ext uri="{FF2B5EF4-FFF2-40B4-BE49-F238E27FC236}">
+                  <a16:creationId xmlns:a16="http://schemas.microsoft.com/office/drawing/2014/main" id="{86DF96EE-B2CF-DE76-CEA1-7C7EE6E95016}"/>
+                </a:ext>
+              </a:extLst>
+            </p:cNvPr>
+            <p:cNvGrpSpPr/>
+            <p:nvPr/>
+          </p:nvGrpSpPr>
+          <p:grpSpPr>
+            <a:xfrm>
+              <a:off x="3010864" y="5087131"/>
+              <a:ext cx="2256459" cy="1168981"/>
+              <a:chOff x="583801" y="5061758"/>
+              <a:chExt cx="2256459" cy="1168981"/>
+            </a:xfrm>
+          </p:grpSpPr>
+          <p:cxnSp>
+            <p:nvCxnSpPr>
+              <p:cNvPr id="51" name="Straight Arrow Connector 50">
+                <a:extLst>
+                  <a:ext uri="{FF2B5EF4-FFF2-40B4-BE49-F238E27FC236}">
+                    <a16:creationId xmlns:a16="http://schemas.microsoft.com/office/drawing/2014/main" id="{925B6B28-E6BF-549F-292F-D2F8FE895783}"/>
+                  </a:ext>
+                </a:extLst>
+              </p:cNvPr>
+              <p:cNvCxnSpPr>
+                <a:cxnSpLocks/>
+              </p:cNvCxnSpPr>
+              <p:nvPr/>
+            </p:nvCxnSpPr>
+            <p:spPr>
+              <a:xfrm>
+                <a:off x="1717987" y="5061758"/>
+                <a:ext cx="0" cy="316467"/>
+              </a:xfrm>
+              <a:prstGeom prst="straightConnector1">
+                <a:avLst/>
+              </a:prstGeom>
+              <a:ln w="28575">
+                <a:solidFill>
+                  <a:schemeClr val="accent4"/>
+                </a:solidFill>
+                <a:tailEnd type="triangle"/>
+              </a:ln>
+            </p:spPr>
+            <p:style>
+              <a:lnRef idx="2">
+                <a:schemeClr val="accent1"/>
+              </a:lnRef>
+              <a:fillRef idx="0">
+                <a:schemeClr val="accent1"/>
+              </a:fillRef>
+              <a:effectRef idx="1">
+                <a:schemeClr val="accent1"/>
+              </a:effectRef>
+              <a:fontRef idx="minor">
+                <a:schemeClr val="tx1"/>
+              </a:fontRef>
+            </p:style>
+          </p:cxnSp>
+          <p:sp>
+            <p:nvSpPr>
+              <p:cNvPr id="52" name="Data 51">
+                <a:extLst>
+                  <a:ext uri="{FF2B5EF4-FFF2-40B4-BE49-F238E27FC236}">
+                    <a16:creationId xmlns:a16="http://schemas.microsoft.com/office/drawing/2014/main" id="{25087E6C-DA74-1612-6D04-51158F02628C}"/>
+                  </a:ext>
+                </a:extLst>
+              </p:cNvPr>
+              <p:cNvSpPr/>
+              <p:nvPr/>
+            </p:nvSpPr>
+            <p:spPr>
+              <a:xfrm>
+                <a:off x="583801" y="5376841"/>
+                <a:ext cx="2256459" cy="853898"/>
+              </a:xfrm>
+              <a:prstGeom prst="flowChartInputOutput">
+                <a:avLst/>
+              </a:prstGeom>
+              <a:solidFill>
+                <a:srgbClr val="FFFF00"/>
+              </a:solidFill>
+            </p:spPr>
+            <p:style>
+              <a:lnRef idx="2">
+                <a:schemeClr val="accent1">
+                  <a:shade val="15000"/>
+                </a:schemeClr>
+              </a:lnRef>
+              <a:fillRef idx="1">
+                <a:schemeClr val="accent1"/>
+              </a:fillRef>
+              <a:effectRef idx="0">
+                <a:schemeClr val="accent1"/>
+              </a:effectRef>
+              <a:fontRef idx="minor">
+                <a:schemeClr val="lt1"/>
+              </a:fontRef>
+            </p:style>
+            <p:txBody>
+              <a:bodyPr rtlCol="0" anchor="ctr"/>
+              <a:lstStyle/>
+              <a:p>
+                <a:pPr algn="ctr"/>
+                <a:r>
+                  <a:rPr lang="en-US" sz="1200" dirty="0">
+                    <a:solidFill>
+                      <a:sysClr val="windowText" lastClr="000000"/>
+                    </a:solidFill>
+                  </a:rPr>
+                  <a:t>Set PORTC to</a:t>
+                </a:r>
+              </a:p>
+              <a:p>
+                <a:pPr algn="ctr"/>
+                <a:r>
+                  <a:rPr lang="en-US" sz="1200" dirty="0">
+                    <a:solidFill>
+                      <a:sysClr val="windowText" lastClr="000000"/>
+                    </a:solidFill>
+                  </a:rPr>
+                  <a:t>0b00011111</a:t>
+                </a:r>
+              </a:p>
+            </p:txBody>
+          </p:sp>
+        </p:grpSp>
+        <p:grpSp>
+          <p:nvGrpSpPr>
+            <p:cNvPr id="53" name="Group 52">
+              <a:extLst>
+                <a:ext uri="{FF2B5EF4-FFF2-40B4-BE49-F238E27FC236}">
+                  <a16:creationId xmlns:a16="http://schemas.microsoft.com/office/drawing/2014/main" id="{D56ED481-8A48-8435-38C0-52BC39923E95}"/>
+                </a:ext>
+              </a:extLst>
+            </p:cNvPr>
+            <p:cNvGrpSpPr/>
+            <p:nvPr/>
+          </p:nvGrpSpPr>
+          <p:grpSpPr>
+            <a:xfrm>
+              <a:off x="8270902" y="5098510"/>
+              <a:ext cx="2256459" cy="1168981"/>
+              <a:chOff x="583801" y="5061758"/>
+              <a:chExt cx="2256459" cy="1168981"/>
+            </a:xfrm>
+          </p:grpSpPr>
+          <p:cxnSp>
+            <p:nvCxnSpPr>
+              <p:cNvPr id="54" name="Straight Arrow Connector 53">
+                <a:extLst>
+                  <a:ext uri="{FF2B5EF4-FFF2-40B4-BE49-F238E27FC236}">
+                    <a16:creationId xmlns:a16="http://schemas.microsoft.com/office/drawing/2014/main" id="{E2773924-8815-72AF-3BFD-73BD7929C5EB}"/>
+                  </a:ext>
+                </a:extLst>
+              </p:cNvPr>
+              <p:cNvCxnSpPr>
+                <a:cxnSpLocks/>
+              </p:cNvCxnSpPr>
+              <p:nvPr/>
+            </p:nvCxnSpPr>
+            <p:spPr>
+              <a:xfrm>
+                <a:off x="1717987" y="5061758"/>
+                <a:ext cx="0" cy="316467"/>
+              </a:xfrm>
+              <a:prstGeom prst="straightConnector1">
+                <a:avLst/>
+              </a:prstGeom>
+              <a:ln w="28575">
+                <a:solidFill>
+                  <a:schemeClr val="accent4"/>
+                </a:solidFill>
+                <a:tailEnd type="triangle"/>
+              </a:ln>
+            </p:spPr>
+            <p:style>
+              <a:lnRef idx="2">
+                <a:schemeClr val="accent1"/>
+              </a:lnRef>
+              <a:fillRef idx="0">
+                <a:schemeClr val="accent1"/>
+              </a:fillRef>
+              <a:effectRef idx="1">
+                <a:schemeClr val="accent1"/>
+              </a:effectRef>
+              <a:fontRef idx="minor">
+                <a:schemeClr val="tx1"/>
+              </a:fontRef>
+            </p:style>
+          </p:cxnSp>
+          <p:sp>
+            <p:nvSpPr>
+              <p:cNvPr id="56" name="Data 55">
+                <a:extLst>
+                  <a:ext uri="{FF2B5EF4-FFF2-40B4-BE49-F238E27FC236}">
+                    <a16:creationId xmlns:a16="http://schemas.microsoft.com/office/drawing/2014/main" id="{0B5FF97E-0AC9-2FF0-2A6B-26C01E77E7A8}"/>
+                  </a:ext>
+                </a:extLst>
+              </p:cNvPr>
+              <p:cNvSpPr/>
+              <p:nvPr/>
+            </p:nvSpPr>
+            <p:spPr>
+              <a:xfrm>
+                <a:off x="583801" y="5376841"/>
+                <a:ext cx="2256459" cy="853898"/>
+              </a:xfrm>
+              <a:prstGeom prst="flowChartInputOutput">
+                <a:avLst/>
+              </a:prstGeom>
+              <a:solidFill>
+                <a:srgbClr val="FFFF00"/>
+              </a:solidFill>
+            </p:spPr>
+            <p:style>
+              <a:lnRef idx="2">
+                <a:schemeClr val="accent1">
+                  <a:shade val="15000"/>
+                </a:schemeClr>
+              </a:lnRef>
+              <a:fillRef idx="1">
+                <a:schemeClr val="accent1"/>
+              </a:fillRef>
+              <a:effectRef idx="0">
+                <a:schemeClr val="accent1"/>
+              </a:effectRef>
+              <a:fontRef idx="minor">
+                <a:schemeClr val="lt1"/>
+              </a:fontRef>
+            </p:style>
+            <p:txBody>
+              <a:bodyPr rtlCol="0" anchor="ctr"/>
+              <a:lstStyle/>
+              <a:p>
+                <a:pPr algn="ctr"/>
+                <a:r>
+                  <a:rPr lang="en-US" sz="1200" dirty="0">
+                    <a:solidFill>
+                      <a:sysClr val="windowText" lastClr="000000"/>
+                    </a:solidFill>
+                  </a:rPr>
+                  <a:t>Set PORTC to</a:t>
+                </a:r>
+              </a:p>
+              <a:p>
+                <a:pPr algn="ctr"/>
+                <a:r>
+                  <a:rPr lang="en-US" sz="1200" dirty="0">
+                    <a:solidFill>
+                      <a:sysClr val="windowText" lastClr="000000"/>
+                    </a:solidFill>
+                  </a:rPr>
+                  <a:t>0b00000011</a:t>
+                </a:r>
+              </a:p>
+            </p:txBody>
+          </p:sp>
+        </p:grpSp>
+        <p:grpSp>
+          <p:nvGrpSpPr>
+            <p:cNvPr id="57" name="Group 56">
+              <a:extLst>
+                <a:ext uri="{FF2B5EF4-FFF2-40B4-BE49-F238E27FC236}">
+                  <a16:creationId xmlns:a16="http://schemas.microsoft.com/office/drawing/2014/main" id="{B2C56E0A-CDA7-A96F-3B01-672DE17680CF}"/>
+                </a:ext>
+              </a:extLst>
+            </p:cNvPr>
+            <p:cNvGrpSpPr/>
+            <p:nvPr/>
+          </p:nvGrpSpPr>
+          <p:grpSpPr>
+            <a:xfrm>
+              <a:off x="10713463" y="5115392"/>
+              <a:ext cx="2256459" cy="1168981"/>
+              <a:chOff x="583801" y="5061758"/>
+              <a:chExt cx="2256459" cy="1168981"/>
+            </a:xfrm>
+          </p:grpSpPr>
+          <p:cxnSp>
+            <p:nvCxnSpPr>
+              <p:cNvPr id="58" name="Straight Arrow Connector 57">
+                <a:extLst>
+                  <a:ext uri="{FF2B5EF4-FFF2-40B4-BE49-F238E27FC236}">
+                    <a16:creationId xmlns:a16="http://schemas.microsoft.com/office/drawing/2014/main" id="{DA043DBB-23BC-EC92-27BF-146AC5C585D8}"/>
+                  </a:ext>
+                </a:extLst>
+              </p:cNvPr>
+              <p:cNvCxnSpPr>
+                <a:cxnSpLocks/>
+              </p:cNvCxnSpPr>
+              <p:nvPr/>
+            </p:nvCxnSpPr>
+            <p:spPr>
+              <a:xfrm>
+                <a:off x="1717987" y="5061758"/>
+                <a:ext cx="0" cy="316467"/>
+              </a:xfrm>
+              <a:prstGeom prst="straightConnector1">
+                <a:avLst/>
+              </a:prstGeom>
+              <a:ln w="28575">
+                <a:solidFill>
+                  <a:schemeClr val="accent1"/>
+                </a:solidFill>
+                <a:tailEnd type="triangle"/>
+              </a:ln>
+            </p:spPr>
+            <p:style>
+              <a:lnRef idx="2">
+                <a:schemeClr val="accent1"/>
+              </a:lnRef>
+              <a:fillRef idx="0">
+                <a:schemeClr val="accent1"/>
+              </a:fillRef>
+              <a:effectRef idx="1">
+                <a:schemeClr val="accent1"/>
+              </a:effectRef>
+              <a:fontRef idx="minor">
+                <a:schemeClr val="tx1"/>
+              </a:fontRef>
+            </p:style>
+          </p:cxnSp>
+          <p:sp>
+            <p:nvSpPr>
+              <p:cNvPr id="59" name="Data 58">
+                <a:extLst>
+                  <a:ext uri="{FF2B5EF4-FFF2-40B4-BE49-F238E27FC236}">
+                    <a16:creationId xmlns:a16="http://schemas.microsoft.com/office/drawing/2014/main" id="{29B04849-4E2F-AC9E-3C5D-B86914D33197}"/>
+                  </a:ext>
+                </a:extLst>
+              </p:cNvPr>
+              <p:cNvSpPr/>
+              <p:nvPr/>
+            </p:nvSpPr>
+            <p:spPr>
+              <a:xfrm>
+                <a:off x="583801" y="5376841"/>
+                <a:ext cx="2256459" cy="853898"/>
+              </a:xfrm>
+              <a:prstGeom prst="flowChartInputOutput">
+                <a:avLst/>
+              </a:prstGeom>
+              <a:solidFill>
+                <a:srgbClr val="FFFF00"/>
+              </a:solidFill>
+            </p:spPr>
+            <p:style>
+              <a:lnRef idx="2">
+                <a:schemeClr val="accent1">
+                  <a:shade val="15000"/>
+                </a:schemeClr>
+              </a:lnRef>
+              <a:fillRef idx="1">
+                <a:schemeClr val="accent1"/>
+              </a:fillRef>
+              <a:effectRef idx="0">
+                <a:schemeClr val="accent1"/>
+              </a:effectRef>
+              <a:fontRef idx="minor">
+                <a:schemeClr val="lt1"/>
+              </a:fontRef>
+            </p:style>
+            <p:txBody>
+              <a:bodyPr rtlCol="0" anchor="ctr"/>
+              <a:lstStyle/>
+              <a:p>
+                <a:pPr algn="ctr"/>
+                <a:r>
+                  <a:rPr lang="en-US" sz="1200" dirty="0">
+                    <a:solidFill>
+                      <a:sysClr val="windowText" lastClr="000000"/>
+                    </a:solidFill>
+                  </a:rPr>
+                  <a:t>Set PORTC to</a:t>
+                </a:r>
+              </a:p>
+              <a:p>
+                <a:pPr algn="ctr"/>
+                <a:r>
+                  <a:rPr lang="en-US" sz="1200" dirty="0">
+                    <a:solidFill>
+                      <a:sysClr val="windowText" lastClr="000000"/>
+                    </a:solidFill>
+                  </a:rPr>
+                  <a:t>0b00000001</a:t>
+                </a:r>
+              </a:p>
+            </p:txBody>
+          </p:sp>
+        </p:grpSp>
+        <p:sp>
+          <p:nvSpPr>
+            <p:cNvPr id="60" name="TextBox 59">
+              <a:extLst>
+                <a:ext uri="{FF2B5EF4-FFF2-40B4-BE49-F238E27FC236}">
+                  <a16:creationId xmlns:a16="http://schemas.microsoft.com/office/drawing/2014/main" id="{F10DD436-D14D-80BF-7A46-365CD77E9BD0}"/>
+                </a:ext>
+              </a:extLst>
+            </p:cNvPr>
+            <p:cNvSpPr txBox="1"/>
+            <p:nvPr/>
+          </p:nvSpPr>
+          <p:spPr>
+            <a:xfrm>
+              <a:off x="3793611" y="5035325"/>
+              <a:ext cx="309700" cy="369332"/>
+            </a:xfrm>
+            <a:prstGeom prst="rect">
+              <a:avLst/>
+            </a:prstGeom>
+            <a:noFill/>
+          </p:spPr>
+          <p:txBody>
+            <a:bodyPr wrap="none" rtlCol="0">
+              <a:spAutoFit/>
+            </a:bodyPr>
+            <a:lstStyle/>
+            <a:p>
+              <a:r>
+                <a:rPr lang="en-US" dirty="0"/>
+                <a:t>Y</a:t>
+              </a:r>
+            </a:p>
+          </p:txBody>
+        </p:sp>
+        <p:sp>
+          <p:nvSpPr>
+            <p:cNvPr id="61" name="TextBox 60">
+              <a:extLst>
+                <a:ext uri="{FF2B5EF4-FFF2-40B4-BE49-F238E27FC236}">
+                  <a16:creationId xmlns:a16="http://schemas.microsoft.com/office/drawing/2014/main" id="{668B30F4-868D-5081-7F77-47B5B160B06A}"/>
+                </a:ext>
+              </a:extLst>
+            </p:cNvPr>
+            <p:cNvSpPr txBox="1"/>
+            <p:nvPr/>
+          </p:nvSpPr>
+          <p:spPr>
+            <a:xfrm>
+              <a:off x="9399131" y="5060698"/>
+              <a:ext cx="309700" cy="369332"/>
+            </a:xfrm>
+            <a:prstGeom prst="rect">
+              <a:avLst/>
+            </a:prstGeom>
+            <a:noFill/>
+          </p:spPr>
+          <p:txBody>
+            <a:bodyPr wrap="none" rtlCol="0">
+              <a:spAutoFit/>
+            </a:bodyPr>
+            <a:lstStyle/>
+            <a:p>
+              <a:r>
+                <a:rPr lang="en-US" dirty="0"/>
+                <a:t>Y</a:t>
+              </a:r>
+            </a:p>
+          </p:txBody>
+        </p:sp>
+        <p:sp>
+          <p:nvSpPr>
+            <p:cNvPr id="62" name="TextBox 61">
+              <a:extLst>
+                <a:ext uri="{FF2B5EF4-FFF2-40B4-BE49-F238E27FC236}">
+                  <a16:creationId xmlns:a16="http://schemas.microsoft.com/office/drawing/2014/main" id="{C0663851-F7DF-119C-2D00-EFE837D8EC1A}"/>
+                </a:ext>
+              </a:extLst>
+            </p:cNvPr>
+            <p:cNvSpPr txBox="1"/>
+            <p:nvPr/>
+          </p:nvSpPr>
+          <p:spPr>
+            <a:xfrm>
+              <a:off x="11878777" y="5102197"/>
+              <a:ext cx="309700" cy="369332"/>
+            </a:xfrm>
+            <a:prstGeom prst="rect">
+              <a:avLst/>
+            </a:prstGeom>
+            <a:noFill/>
+          </p:spPr>
+          <p:txBody>
+            <a:bodyPr wrap="none" rtlCol="0">
+              <a:spAutoFit/>
+            </a:bodyPr>
+            <a:lstStyle/>
+            <a:p>
+              <a:r>
+                <a:rPr lang="en-US" dirty="0"/>
+                <a:t>Y</a:t>
+              </a:r>
+            </a:p>
+          </p:txBody>
+        </p:sp>
+        <p:cxnSp>
+          <p:nvCxnSpPr>
+            <p:cNvPr id="64" name="Straight Arrow Connector 63">
+              <a:extLst>
+                <a:ext uri="{FF2B5EF4-FFF2-40B4-BE49-F238E27FC236}">
+                  <a16:creationId xmlns:a16="http://schemas.microsoft.com/office/drawing/2014/main" id="{5DD62422-3CEB-E17F-FF1C-B218F7F6B1F2}"/>
+                </a:ext>
+              </a:extLst>
+            </p:cNvPr>
+            <p:cNvCxnSpPr>
+              <a:cxnSpLocks/>
+              <a:stCxn id="48" idx="4"/>
+              <a:endCxn id="34" idx="0"/>
+            </p:cNvCxnSpPr>
+            <p:nvPr/>
+          </p:nvCxnSpPr>
+          <p:spPr>
+            <a:xfrm>
+              <a:off x="1712031" y="6230739"/>
+              <a:ext cx="19130" cy="755231"/>
+            </a:xfrm>
+            <a:prstGeom prst="straightConnector1">
+              <a:avLst/>
+            </a:prstGeom>
+            <a:ln w="28575">
+              <a:solidFill>
+                <a:schemeClr val="accent1"/>
+              </a:solidFill>
+              <a:tailEnd type="triangle"/>
+            </a:ln>
+          </p:spPr>
+          <p:style>
+            <a:lnRef idx="2">
+              <a:schemeClr val="accent1"/>
+            </a:lnRef>
+            <a:fillRef idx="0">
+              <a:schemeClr val="accent1"/>
+            </a:fillRef>
+            <a:effectRef idx="1">
+              <a:schemeClr val="accent1"/>
+            </a:effectRef>
+            <a:fontRef idx="minor">
+              <a:schemeClr val="tx1"/>
+            </a:fontRef>
+          </p:style>
+        </p:cxnSp>
+        <p:cxnSp>
+          <p:nvCxnSpPr>
+            <p:cNvPr id="68" name="Straight Arrow Connector 67">
+              <a:extLst>
+                <a:ext uri="{FF2B5EF4-FFF2-40B4-BE49-F238E27FC236}">
+                  <a16:creationId xmlns:a16="http://schemas.microsoft.com/office/drawing/2014/main" id="{F885A86B-F187-7315-EF7E-D146CCC6B106}"/>
+                </a:ext>
+              </a:extLst>
+            </p:cNvPr>
+            <p:cNvCxnSpPr>
+              <a:cxnSpLocks/>
+            </p:cNvCxnSpPr>
+            <p:nvPr/>
+          </p:nvCxnSpPr>
+          <p:spPr>
+            <a:xfrm flipH="1" flipV="1">
+              <a:off x="1712031" y="6579505"/>
+              <a:ext cx="11654006" cy="28849"/>
+            </a:xfrm>
+            <a:prstGeom prst="straightConnector1">
+              <a:avLst/>
+            </a:prstGeom>
+            <a:ln w="28575">
+              <a:solidFill>
+                <a:schemeClr val="accent4"/>
+              </a:solidFill>
+              <a:tailEnd type="triangle"/>
+            </a:ln>
+          </p:spPr>
+          <p:style>
+            <a:lnRef idx="2">
+              <a:schemeClr val="accent1"/>
+            </a:lnRef>
+            <a:fillRef idx="0">
+              <a:schemeClr val="accent1"/>
+            </a:fillRef>
+            <a:effectRef idx="1">
+              <a:schemeClr val="accent1"/>
+            </a:effectRef>
+            <a:fontRef idx="minor">
+              <a:schemeClr val="tx1"/>
+            </a:fontRef>
+          </p:style>
+        </p:cxnSp>
+        <p:cxnSp>
+          <p:nvCxnSpPr>
+            <p:cNvPr id="69" name="Straight Arrow Connector 68">
+              <a:extLst>
+                <a:ext uri="{FF2B5EF4-FFF2-40B4-BE49-F238E27FC236}">
+                  <a16:creationId xmlns:a16="http://schemas.microsoft.com/office/drawing/2014/main" id="{13000AD9-EB6B-99F1-2682-65B7E54A6408}"/>
+                </a:ext>
+              </a:extLst>
+            </p:cNvPr>
+            <p:cNvCxnSpPr>
+              <a:cxnSpLocks/>
+            </p:cNvCxnSpPr>
+            <p:nvPr/>
+          </p:nvCxnSpPr>
+          <p:spPr>
+            <a:xfrm>
+              <a:off x="4145050" y="6284373"/>
+              <a:ext cx="0" cy="316467"/>
+            </a:xfrm>
+            <a:prstGeom prst="straightConnector1">
+              <a:avLst/>
+            </a:prstGeom>
+            <a:ln w="28575">
+              <a:solidFill>
+                <a:schemeClr val="accent4"/>
+              </a:solidFill>
+              <a:tailEnd type="triangle"/>
+            </a:ln>
+          </p:spPr>
+          <p:style>
+            <a:lnRef idx="2">
+              <a:schemeClr val="accent1"/>
+            </a:lnRef>
+            <a:fillRef idx="0">
+              <a:schemeClr val="accent1"/>
+            </a:fillRef>
+            <a:effectRef idx="1">
+              <a:schemeClr val="accent1"/>
+            </a:effectRef>
+            <a:fontRef idx="minor">
+              <a:schemeClr val="tx1"/>
+            </a:fontRef>
+          </p:style>
+        </p:cxnSp>
+        <p:cxnSp>
+          <p:nvCxnSpPr>
+            <p:cNvPr id="71" name="Straight Arrow Connector 70">
+              <a:extLst>
+                <a:ext uri="{FF2B5EF4-FFF2-40B4-BE49-F238E27FC236}">
+                  <a16:creationId xmlns:a16="http://schemas.microsoft.com/office/drawing/2014/main" id="{26675B50-1A5D-7489-1208-AD8163B67687}"/>
+                </a:ext>
+              </a:extLst>
+            </p:cNvPr>
+            <p:cNvCxnSpPr>
+              <a:cxnSpLocks/>
+            </p:cNvCxnSpPr>
+            <p:nvPr/>
+          </p:nvCxnSpPr>
+          <p:spPr>
+            <a:xfrm>
+              <a:off x="9399963" y="6256112"/>
+              <a:ext cx="0" cy="316467"/>
+            </a:xfrm>
+            <a:prstGeom prst="straightConnector1">
+              <a:avLst/>
+            </a:prstGeom>
+            <a:ln w="28575">
+              <a:solidFill>
+                <a:schemeClr val="accent4"/>
+              </a:solidFill>
+              <a:tailEnd type="triangle"/>
+            </a:ln>
+          </p:spPr>
+          <p:style>
+            <a:lnRef idx="2">
+              <a:schemeClr val="accent1"/>
+            </a:lnRef>
+            <a:fillRef idx="0">
+              <a:schemeClr val="accent1"/>
+            </a:fillRef>
+            <a:effectRef idx="1">
+              <a:schemeClr val="accent1"/>
+            </a:effectRef>
+            <a:fontRef idx="minor">
+              <a:schemeClr val="tx1"/>
+            </a:fontRef>
+          </p:style>
+        </p:cxnSp>
+        <p:cxnSp>
+          <p:nvCxnSpPr>
+            <p:cNvPr id="72" name="Straight Arrow Connector 71">
+              <a:extLst>
+                <a:ext uri="{FF2B5EF4-FFF2-40B4-BE49-F238E27FC236}">
+                  <a16:creationId xmlns:a16="http://schemas.microsoft.com/office/drawing/2014/main" id="{5215AB1A-9886-DAA9-A7ED-2736C663FCF3}"/>
+                </a:ext>
+              </a:extLst>
+            </p:cNvPr>
+            <p:cNvCxnSpPr>
+              <a:cxnSpLocks/>
+            </p:cNvCxnSpPr>
+            <p:nvPr/>
+          </p:nvCxnSpPr>
+          <p:spPr>
+            <a:xfrm>
+              <a:off x="11837558" y="6284373"/>
+              <a:ext cx="0" cy="316467"/>
+            </a:xfrm>
+            <a:prstGeom prst="straightConnector1">
+              <a:avLst/>
+            </a:prstGeom>
+            <a:ln w="28575">
+              <a:solidFill>
+                <a:schemeClr val="accent4"/>
+              </a:solidFill>
+              <a:headEnd type="none" w="med" len="med"/>
+              <a:tailEnd type="none" w="med" len="med"/>
+            </a:ln>
+          </p:spPr>
+          <p:style>
+            <a:lnRef idx="2">
+              <a:schemeClr val="accent1"/>
+            </a:lnRef>
+            <a:fillRef idx="0">
+              <a:schemeClr val="accent1"/>
+            </a:fillRef>
+            <a:effectRef idx="1">
+              <a:schemeClr val="accent1"/>
+            </a:effectRef>
+            <a:fontRef idx="minor">
+              <a:schemeClr val="tx1"/>
+            </a:fontRef>
+          </p:style>
+        </p:cxnSp>
+        <p:cxnSp>
+          <p:nvCxnSpPr>
+            <p:cNvPr id="76" name="Straight Connector 75">
+              <a:extLst>
+                <a:ext uri="{FF2B5EF4-FFF2-40B4-BE49-F238E27FC236}">
+                  <a16:creationId xmlns:a16="http://schemas.microsoft.com/office/drawing/2014/main" id="{0231B805-2665-AA55-A6B7-1F79FD51796D}"/>
+                </a:ext>
+              </a:extLst>
+            </p:cNvPr>
+            <p:cNvCxnSpPr>
+              <a:cxnSpLocks/>
+            </p:cNvCxnSpPr>
+            <p:nvPr/>
+          </p:nvCxnSpPr>
+          <p:spPr>
+            <a:xfrm>
+              <a:off x="13366037" y="4613242"/>
+              <a:ext cx="0" cy="1995112"/>
+            </a:xfrm>
+            <a:prstGeom prst="line">
+              <a:avLst/>
+            </a:prstGeom>
+            <a:ln w="28575">
+              <a:solidFill>
+                <a:schemeClr val="accent4"/>
+              </a:solidFill>
+            </a:ln>
+          </p:spPr>
+          <p:style>
+            <a:lnRef idx="2">
+              <a:schemeClr val="accent1"/>
+            </a:lnRef>
+            <a:fillRef idx="0">
+              <a:schemeClr val="accent1"/>
+            </a:fillRef>
+            <a:effectRef idx="1">
+              <a:schemeClr val="accent1"/>
+            </a:effectRef>
+            <a:fontRef idx="minor">
+              <a:schemeClr val="tx1"/>
+            </a:fontRef>
+          </p:style>
+        </p:cxnSp>
+      </p:grpSp>
+    </p:spTree>
+    <p:extLst>
+      <p:ext uri="{BB962C8B-B14F-4D97-AF65-F5344CB8AC3E}">
+        <p14:creationId xmlns:p14="http://schemas.microsoft.com/office/powerpoint/2010/main" val="4072703437"/>
+      </p:ext>
+    </p:extLst>
+  </p:cSld>
+  <p:clrMapOvr>
+    <a:masterClrMapping/>
+  </p:clrMapOvr>
+</p:sld>
+</file>
+
 <file path=ppt/theme/theme1.xml><?xml version="1.0" encoding="utf-8"?>
 <a:theme xmlns:a="http://schemas.openxmlformats.org/drawingml/2006/main" name="Office Theme">
   <a:themeElements>

</xml_diff>

<commit_message>
Added for-loop to flowchart samples
</commit_message>
<xml_diff>
--- a/website/labs/get_started/pictures/flow-charts.pptx
+++ b/website/labs/get_started/pictures/flow-charts.pptx
@@ -7,8 +7,9 @@
   <p:sldIdLst>
     <p:sldId id="256" r:id="rId2"/>
     <p:sldId id="257" r:id="rId3"/>
-    <p:sldId id="258" r:id="rId4"/>
-    <p:sldId id="259" r:id="rId5"/>
+    <p:sldId id="260" r:id="rId4"/>
+    <p:sldId id="258" r:id="rId5"/>
+    <p:sldId id="259" r:id="rId6"/>
   </p:sldIdLst>
   <p:sldSz cx="12801600" cy="9601200" type="A3"/>
   <p:notesSz cx="6858000" cy="9144000"/>
@@ -246,7 +247,7 @@
           <a:p>
             <a:fld id="{B85DF64A-A64B-9B40-9390-C6B9C8EAFEF9}" type="datetimeFigureOut">
               <a:rPr lang="en-US" smtClean="0"/>
-              <a:t>10/25/24</a:t>
+              <a:t>11/14/2024</a:t>
             </a:fld>
             <a:endParaRPr lang="en-US"/>
           </a:p>
@@ -416,7 +417,7 @@
           <a:p>
             <a:fld id="{B85DF64A-A64B-9B40-9390-C6B9C8EAFEF9}" type="datetimeFigureOut">
               <a:rPr lang="en-US" smtClean="0"/>
-              <a:t>10/25/24</a:t>
+              <a:t>11/14/2024</a:t>
             </a:fld>
             <a:endParaRPr lang="en-US"/>
           </a:p>
@@ -596,7 +597,7 @@
           <a:p>
             <a:fld id="{B85DF64A-A64B-9B40-9390-C6B9C8EAFEF9}" type="datetimeFigureOut">
               <a:rPr lang="en-US" smtClean="0"/>
-              <a:t>10/25/24</a:t>
+              <a:t>11/14/2024</a:t>
             </a:fld>
             <a:endParaRPr lang="en-US"/>
           </a:p>
@@ -766,7 +767,7 @@
           <a:p>
             <a:fld id="{B85DF64A-A64B-9B40-9390-C6B9C8EAFEF9}" type="datetimeFigureOut">
               <a:rPr lang="en-US" smtClean="0"/>
-              <a:t>10/25/24</a:t>
+              <a:t>11/14/2024</a:t>
             </a:fld>
             <a:endParaRPr lang="en-US"/>
           </a:p>
@@ -1012,7 +1013,7 @@
           <a:p>
             <a:fld id="{B85DF64A-A64B-9B40-9390-C6B9C8EAFEF9}" type="datetimeFigureOut">
               <a:rPr lang="en-US" smtClean="0"/>
-              <a:t>10/25/24</a:t>
+              <a:t>11/14/2024</a:t>
             </a:fld>
             <a:endParaRPr lang="en-US"/>
           </a:p>
@@ -1244,7 +1245,7 @@
           <a:p>
             <a:fld id="{B85DF64A-A64B-9B40-9390-C6B9C8EAFEF9}" type="datetimeFigureOut">
               <a:rPr lang="en-US" smtClean="0"/>
-              <a:t>10/25/24</a:t>
+              <a:t>11/14/2024</a:t>
             </a:fld>
             <a:endParaRPr lang="en-US"/>
           </a:p>
@@ -1611,7 +1612,7 @@
           <a:p>
             <a:fld id="{B85DF64A-A64B-9B40-9390-C6B9C8EAFEF9}" type="datetimeFigureOut">
               <a:rPr lang="en-US" smtClean="0"/>
-              <a:t>10/25/24</a:t>
+              <a:t>11/14/2024</a:t>
             </a:fld>
             <a:endParaRPr lang="en-US"/>
           </a:p>
@@ -1729,7 +1730,7 @@
           <a:p>
             <a:fld id="{B85DF64A-A64B-9B40-9390-C6B9C8EAFEF9}" type="datetimeFigureOut">
               <a:rPr lang="en-US" smtClean="0"/>
-              <a:t>10/25/24</a:t>
+              <a:t>11/14/2024</a:t>
             </a:fld>
             <a:endParaRPr lang="en-US"/>
           </a:p>
@@ -1824,7 +1825,7 @@
           <a:p>
             <a:fld id="{B85DF64A-A64B-9B40-9390-C6B9C8EAFEF9}" type="datetimeFigureOut">
               <a:rPr lang="en-US" smtClean="0"/>
-              <a:t>10/25/24</a:t>
+              <a:t>11/14/2024</a:t>
             </a:fld>
             <a:endParaRPr lang="en-US"/>
           </a:p>
@@ -2101,7 +2102,7 @@
           <a:p>
             <a:fld id="{B85DF64A-A64B-9B40-9390-C6B9C8EAFEF9}" type="datetimeFigureOut">
               <a:rPr lang="en-US" smtClean="0"/>
-              <a:t>10/25/24</a:t>
+              <a:t>11/14/2024</a:t>
             </a:fld>
             <a:endParaRPr lang="en-US"/>
           </a:p>
@@ -2358,7 +2359,7 @@
           <a:p>
             <a:fld id="{B85DF64A-A64B-9B40-9390-C6B9C8EAFEF9}" type="datetimeFigureOut">
               <a:rPr lang="en-US" smtClean="0"/>
-              <a:t>10/25/24</a:t>
+              <a:t>11/14/2024</a:t>
             </a:fld>
             <a:endParaRPr lang="en-US"/>
           </a:p>
@@ -2571,7 +2572,7 @@
           <a:p>
             <a:fld id="{B85DF64A-A64B-9B40-9390-C6B9C8EAFEF9}" type="datetimeFigureOut">
               <a:rPr lang="en-US" smtClean="0"/>
-              <a:t>10/25/24</a:t>
+              <a:t>11/14/2024</a:t>
             </a:fld>
             <a:endParaRPr lang="en-US"/>
           </a:p>
@@ -6278,6 +6279,163 @@
   <p:cSld>
     <p:spTree>
       <p:nvGrpSpPr>
+        <p:cNvPr id="1" name=""/>
+        <p:cNvGrpSpPr/>
+        <p:nvPr/>
+      </p:nvGrpSpPr>
+      <p:grpSpPr>
+        <a:xfrm>
+          <a:off x="0" y="0"/>
+          <a:ext cx="0" cy="0"/>
+          <a:chOff x="0" y="0"/>
+          <a:chExt cx="0" cy="0"/>
+        </a:xfrm>
+      </p:grpSpPr>
+      <p:pic>
+        <p:nvPicPr>
+          <p:cNvPr id="1026" name="Picture 2">
+            <a:extLst>
+              <a:ext uri="{FF2B5EF4-FFF2-40B4-BE49-F238E27FC236}">
+                <a16:creationId xmlns:a16="http://schemas.microsoft.com/office/drawing/2014/main" id="{3B82634D-BD5E-1134-185E-58C94D3E5D08}"/>
+              </a:ext>
+            </a:extLst>
+          </p:cNvPr>
+          <p:cNvPicPr>
+            <a:picLocks noChangeAspect="1" noChangeArrowheads="1"/>
+          </p:cNvPicPr>
+          <p:nvPr/>
+        </p:nvPicPr>
+        <p:blipFill>
+          <a:blip r:embed="rId2">
+            <a:extLst>
+              <a:ext uri="{28A0092B-C50C-407E-A947-70E740481C1C}">
+                <a14:useLocalDpi xmlns:a14="http://schemas.microsoft.com/office/drawing/2010/main" val="0"/>
+              </a:ext>
+            </a:extLst>
+          </a:blip>
+          <a:srcRect/>
+          <a:stretch>
+            <a:fillRect/>
+          </a:stretch>
+        </p:blipFill>
+        <p:spPr bwMode="auto">
+          <a:xfrm>
+            <a:off x="5076825" y="1143000"/>
+            <a:ext cx="2647950" cy="7315200"/>
+          </a:xfrm>
+          <a:prstGeom prst="rect">
+            <a:avLst/>
+          </a:prstGeom>
+          <a:noFill/>
+          <a:extLst>
+            <a:ext uri="{909E8E84-426E-40DD-AFC4-6F175D3DCCD1}">
+              <a14:hiddenFill xmlns:a14="http://schemas.microsoft.com/office/drawing/2010/main">
+                <a:solidFill>
+                  <a:srgbClr val="FFFFFF"/>
+                </a:solidFill>
+              </a14:hiddenFill>
+            </a:ext>
+          </a:extLst>
+        </p:spPr>
+      </p:pic>
+      <p:sp>
+        <p:nvSpPr>
+          <p:cNvPr id="2" name="TextBox 1">
+            <a:extLst>
+              <a:ext uri="{FF2B5EF4-FFF2-40B4-BE49-F238E27FC236}">
+                <a16:creationId xmlns:a16="http://schemas.microsoft.com/office/drawing/2014/main" id="{5A4F1CD0-F2E9-4CBE-6735-7DAC9ED71ADC}"/>
+              </a:ext>
+            </a:extLst>
+          </p:cNvPr>
+          <p:cNvSpPr txBox="1"/>
+          <p:nvPr/>
+        </p:nvSpPr>
+        <p:spPr>
+          <a:xfrm>
+            <a:off x="461165" y="323099"/>
+            <a:ext cx="3666336" cy="2031325"/>
+          </a:xfrm>
+          <a:prstGeom prst="rect">
+            <a:avLst/>
+          </a:prstGeom>
+          <a:noFill/>
+        </p:spPr>
+        <p:txBody>
+          <a:bodyPr wrap="square" rtlCol="0">
+            <a:spAutoFit/>
+          </a:bodyPr>
+          <a:lstStyle/>
+          <a:p>
+            <a:r>
+              <a:rPr lang="en-US" dirty="0"/>
+              <a:t>For loop:</a:t>
+            </a:r>
+          </a:p>
+          <a:p>
+            <a:endParaRPr lang="en-US" dirty="0"/>
+          </a:p>
+          <a:p>
+            <a:r>
+              <a:rPr lang="en-US" dirty="0">
+                <a:latin typeface="Cordia New" panose="020B0502040204020203" pitchFamily="34" charset="-34"/>
+                <a:cs typeface="Cordia New" panose="020B0502040204020203" pitchFamily="34" charset="-34"/>
+              </a:rPr>
+              <a:t>for(initialize; test; increment) {}</a:t>
+            </a:r>
+          </a:p>
+          <a:p>
+            <a:endParaRPr lang="en-US" dirty="0"/>
+          </a:p>
+          <a:p>
+            <a:r>
+              <a:rPr lang="en-US" dirty="0"/>
+              <a:t>Note the position of the </a:t>
+            </a:r>
+            <a:r>
+              <a:rPr lang="en-US" i="1" dirty="0"/>
+              <a:t>initialize</a:t>
+            </a:r>
+            <a:r>
+              <a:rPr lang="en-US" dirty="0"/>
+              <a:t>, </a:t>
+            </a:r>
+            <a:r>
+              <a:rPr lang="en-US" i="1" dirty="0"/>
+              <a:t>test</a:t>
+            </a:r>
+            <a:r>
+              <a:rPr lang="en-US" dirty="0"/>
+              <a:t>, </a:t>
+            </a:r>
+            <a:r>
+              <a:rPr lang="en-US" i="1" dirty="0"/>
+              <a:t>increment</a:t>
+            </a:r>
+            <a:r>
+              <a:rPr lang="en-US" dirty="0"/>
+              <a:t> statements in the flow chart.</a:t>
+            </a:r>
+          </a:p>
+        </p:txBody>
+      </p:sp>
+    </p:spTree>
+    <p:extLst>
+      <p:ext uri="{BB962C8B-B14F-4D97-AF65-F5344CB8AC3E}">
+        <p14:creationId xmlns:p14="http://schemas.microsoft.com/office/powerpoint/2010/main" val="461502860"/>
+      </p:ext>
+    </p:extLst>
+  </p:cSld>
+  <p:clrMapOvr>
+    <a:masterClrMapping/>
+  </p:clrMapOvr>
+</p:sld>
+</file>
+
+<file path=ppt/slides/slide4.xml><?xml version="1.0" encoding="utf-8"?>
+<p:sld xmlns:a="http://schemas.openxmlformats.org/drawingml/2006/main" xmlns:r="http://schemas.openxmlformats.org/officeDocument/2006/relationships" xmlns:p="http://schemas.openxmlformats.org/presentationml/2006/main">
+  <p:cSld>
+    <p:spTree>
+      <p:nvGrpSpPr>
         <p:cNvPr id="1" name="">
           <a:extLst>
             <a:ext uri="{FF2B5EF4-FFF2-40B4-BE49-F238E27FC236}">
@@ -7620,7 +7778,7 @@
 </p:sld>
 </file>
 
-<file path=ppt/slides/slide4.xml><?xml version="1.0" encoding="utf-8"?>
+<file path=ppt/slides/slide5.xml><?xml version="1.0" encoding="utf-8"?>
 <p:sld xmlns:a="http://schemas.openxmlformats.org/drawingml/2006/main" xmlns:r="http://schemas.openxmlformats.org/officeDocument/2006/relationships" xmlns:p="http://schemas.openxmlformats.org/presentationml/2006/main">
   <p:cSld>
     <p:spTree>

</xml_diff>